<commit_message>
Fixes on multidimentional arrays basics slides
</commit_message>
<xml_diff>
--- a/Courses/Software-Sciences/Module-2-DS-and-Algo/04.1-Multidimentional-Arrays-Basics/04.1-Multidimentional-Arrays-Basics.pptx
+++ b/Courses/Software-Sciences/Module-2-DS-and-Algo/04.1-Multidimentional-Arrays-Basics/04.1-Multidimentional-Arrays-Basics.pptx
@@ -313,7 +313,7 @@
           <a:p>
             <a:fld id="{4E087215-0C8F-4762-A664-737A353EC9A4}" type="datetimeFigureOut">
               <a:rPr lang="bg-BG" smtClean="0"/>
-              <a:t>6.7.2023 г.</a:t>
+              <a:t>19.08.23 г.</a:t>
             </a:fld>
             <a:endParaRPr lang="bg-BG" dirty="0"/>
           </a:p>
@@ -504,7 +504,7 @@
           <a:p>
             <a:fld id="{72D84649-876A-46C9-8472-14CB09C070D8}" type="datetimeFigureOut">
               <a:rPr lang="en-US" smtClean="0"/>
-              <a:t>7/6/2023</a:t>
+              <a:t>8/19/23</a:t>
             </a:fld>
             <a:endParaRPr lang="en-US" dirty="0"/>
           </a:p>
@@ -8829,8 +8829,8 @@
         </p:nvSpPr>
         <p:spPr>
           <a:xfrm>
-            <a:off x="670897" y="1326438"/>
-            <a:ext cx="10959592" cy="882424"/>
+            <a:off x="670897" y="1314000"/>
+            <a:ext cx="10959592" cy="692162"/>
           </a:xfrm>
         </p:spPr>
         <p:txBody>
@@ -8843,8 +8843,17 @@
               <a:rPr lang="en-US" sz="3550" dirty="0">
                 <a:cs typeface="Calibri"/>
               </a:rPr>
-              <a:t>Обработка на матрици и на назъбени матрици</a:t>
-            </a:r>
+              <a:t>Обработка на матрици и на назъбени </a:t>
+            </a:r>
+            <a:r>
+              <a:rPr lang="bg-BG" sz="3550" dirty="0">
+                <a:cs typeface="Calibri"/>
+              </a:rPr>
+              <a:t>масиви</a:t>
+            </a:r>
+            <a:endParaRPr lang="en-US" sz="3550" dirty="0">
+              <a:cs typeface="Calibri"/>
+            </a:endParaRPr>
           </a:p>
         </p:txBody>
       </p:sp>
@@ -9082,8 +9091,21 @@
           <a:p>
             <a:r>
               <a:rPr lang="en-US" sz="3950" dirty="0"/>
-              <a:t>Задача: Сума на елементите от масива</a:t>
-            </a:r>
+              <a:t>Задача: Сума на елементите </a:t>
+            </a:r>
+            <a:r>
+              <a:rPr lang="bg-BG" sz="3950" dirty="0"/>
+              <a:t>в</a:t>
+            </a:r>
+            <a:r>
+              <a:rPr lang="en-US" sz="3950" dirty="0"/>
+              <a:t> </a:t>
+            </a:r>
+            <a:r>
+              <a:rPr lang="bg-BG" sz="3950" dirty="0"/>
+              <a:t>матрица</a:t>
+            </a:r>
+            <a:endParaRPr lang="en-US" sz="3950" dirty="0"/>
           </a:p>
         </p:txBody>
       </p:sp>
@@ -9097,7 +9119,7 @@
         </p:nvSpPr>
         <p:spPr bwMode="auto">
           <a:xfrm>
-            <a:off x="1127448" y="4243243"/>
+            <a:off x="1127448" y="4526333"/>
             <a:ext cx="3161476" cy="1569251"/>
           </a:xfrm>
           <a:prstGeom prst="rect">
@@ -9172,7 +9194,7 @@
         </p:nvSpPr>
         <p:spPr bwMode="auto">
           <a:xfrm>
-            <a:off x="5201327" y="4461278"/>
+            <a:off x="5201327" y="4744368"/>
             <a:ext cx="609441" cy="1200016"/>
           </a:xfrm>
           <a:prstGeom prst="rect">
@@ -9236,7 +9258,7 @@
         </p:nvSpPr>
         <p:spPr>
           <a:xfrm>
-            <a:off x="4518808" y="4884345"/>
+            <a:off x="4518808" y="5167435"/>
             <a:ext cx="457081" cy="297498"/>
           </a:xfrm>
           <a:prstGeom prst="rightArrow">
@@ -9314,7 +9336,7 @@
         </p:nvSpPr>
         <p:spPr bwMode="auto">
           <a:xfrm>
-            <a:off x="6531795" y="4276659"/>
+            <a:off x="6531795" y="4559749"/>
             <a:ext cx="2018774" cy="1569251"/>
           </a:xfrm>
           <a:prstGeom prst="rect">
@@ -9395,7 +9417,7 @@
         </p:nvSpPr>
         <p:spPr bwMode="auto">
           <a:xfrm>
-            <a:off x="9464732" y="4461977"/>
+            <a:off x="9464732" y="4745067"/>
             <a:ext cx="609441" cy="1200016"/>
           </a:xfrm>
           <a:prstGeom prst="rect">
@@ -9465,7 +9487,7 @@
         </p:nvSpPr>
         <p:spPr>
           <a:xfrm>
-            <a:off x="8779110" y="4884345"/>
+            <a:off x="8779110" y="5167435"/>
             <a:ext cx="457081" cy="297498"/>
           </a:xfrm>
           <a:prstGeom prst="rightArrow">
@@ -9863,7 +9885,11 @@
             <a:pPr marL="456565" indent="-456565"/>
             <a:r>
               <a:rPr lang="en-US" sz="3600" dirty="0"/>
-              <a:t>Отпечатайте броя на редиците</a:t>
+              <a:t>Отпечатайте броя на </a:t>
+            </a:r>
+            <a:r>
+              <a:rPr lang="bg-BG" sz="3600" dirty="0"/>
+              <a:t>редовете</a:t>
             </a:r>
             <a:endParaRPr lang="en-US" sz="3600" dirty="0">
               <a:cs typeface="Calibri"/>
@@ -9960,7 +9986,7 @@
                                         <p:tgtEl>
                                           <p:spTgt spid="15">
                                             <p:txEl>
-                                              <p:pRg st="0" end="0"/>
+                                              <p:pRg st="1" end="1"/>
                                             </p:txEl>
                                           </p:spTgt>
                                         </p:tgtEl>
@@ -10009,7 +10035,7 @@
                                         <p:tgtEl>
                                           <p:spTgt spid="15">
                                             <p:txEl>
-                                              <p:pRg st="1" end="1"/>
+                                              <p:pRg st="2" end="2"/>
                                             </p:txEl>
                                           </p:spTgt>
                                         </p:tgtEl>
@@ -10058,7 +10084,7 @@
                                         <p:tgtEl>
                                           <p:spTgt spid="15">
                                             <p:txEl>
-                                              <p:pRg st="2" end="2"/>
+                                              <p:pRg st="3" end="3"/>
                                             </p:txEl>
                                           </p:spTgt>
                                         </p:tgtEl>
@@ -10092,7 +10118,7 @@
                             </p:stCondLst>
                             <p:childTnLst>
                               <p:par>
-                                <p:cTn id="17" presetID="1" presetClass="entr" presetSubtype="0" fill="hold" nodeType="clickEffect">
+                                <p:cTn id="17" presetID="1" presetClass="entr" presetSubtype="0" fill="hold" grpId="0" nodeType="clickEffect">
                                   <p:stCondLst>
                                     <p:cond delay="0"/>
                                   </p:stCondLst>
@@ -10100,55 +10126,6 @@
                                     <p:set>
                                       <p:cBhvr>
                                         <p:cTn id="18" dur="1" fill="hold">
-                                          <p:stCondLst>
-                                            <p:cond delay="0"/>
-                                          </p:stCondLst>
-                                        </p:cTn>
-                                        <p:tgtEl>
-                                          <p:spTgt spid="15">
-                                            <p:txEl>
-                                              <p:pRg st="3" end="3"/>
-                                            </p:txEl>
-                                          </p:spTgt>
-                                        </p:tgtEl>
-                                        <p:attrNameLst>
-                                          <p:attrName>style.visibility</p:attrName>
-                                        </p:attrNameLst>
-                                      </p:cBhvr>
-                                      <p:to>
-                                        <p:strVal val="visible"/>
-                                      </p:to>
-                                    </p:set>
-                                  </p:childTnLst>
-                                </p:cTn>
-                              </p:par>
-                            </p:childTnLst>
-                          </p:cTn>
-                        </p:par>
-                      </p:childTnLst>
-                    </p:cTn>
-                  </p:par>
-                  <p:par>
-                    <p:cTn id="19" fill="hold">
-                      <p:stCondLst>
-                        <p:cond delay="indefinite"/>
-                      </p:stCondLst>
-                      <p:childTnLst>
-                        <p:par>
-                          <p:cTn id="20" fill="hold">
-                            <p:stCondLst>
-                              <p:cond delay="0"/>
-                            </p:stCondLst>
-                            <p:childTnLst>
-                              <p:par>
-                                <p:cTn id="21" presetID="1" presetClass="entr" presetSubtype="0" fill="hold" grpId="0" nodeType="clickEffect">
-                                  <p:stCondLst>
-                                    <p:cond delay="0"/>
-                                  </p:stCondLst>
-                                  <p:childTnLst>
-                                    <p:set>
-                                      <p:cBhvr>
-                                        <p:cTn id="22" dur="1" fill="hold">
                                           <p:stCondLst>
                                             <p:cond delay="0"/>
                                           </p:stCondLst>
@@ -10168,14 +10145,14 @@
                                 </p:cTn>
                               </p:par>
                               <p:par>
-                                <p:cTn id="23" presetID="1" presetClass="entr" presetSubtype="0" fill="hold" grpId="0" nodeType="withEffect">
+                                <p:cTn id="19" presetID="1" presetClass="entr" presetSubtype="0" fill="hold" grpId="0" nodeType="withEffect">
                                   <p:stCondLst>
                                     <p:cond delay="0"/>
                                   </p:stCondLst>
                                   <p:childTnLst>
                                     <p:set>
                                       <p:cBhvr>
-                                        <p:cTn id="24" dur="1" fill="hold">
+                                        <p:cTn id="20" dur="1" fill="hold">
                                           <p:stCondLst>
                                             <p:cond delay="0"/>
                                           </p:stCondLst>
@@ -10195,14 +10172,14 @@
                                 </p:cTn>
                               </p:par>
                               <p:par>
-                                <p:cTn id="25" presetID="1" presetClass="entr" presetSubtype="0" fill="hold" grpId="0" nodeType="withEffect">
+                                <p:cTn id="21" presetID="1" presetClass="entr" presetSubtype="0" fill="hold" grpId="0" nodeType="withEffect">
                                   <p:stCondLst>
                                     <p:cond delay="0"/>
                                   </p:stCondLst>
                                   <p:childTnLst>
                                     <p:set>
                                       <p:cBhvr>
-                                        <p:cTn id="26" dur="1" fill="hold">
+                                        <p:cTn id="22" dur="1" fill="hold">
                                           <p:stCondLst>
                                             <p:cond delay="0"/>
                                           </p:stCondLst>
@@ -10228,26 +10205,26 @@
                     </p:cTn>
                   </p:par>
                   <p:par>
-                    <p:cTn id="27" fill="hold">
+                    <p:cTn id="23" fill="hold">
                       <p:stCondLst>
                         <p:cond delay="indefinite"/>
                       </p:stCondLst>
                       <p:childTnLst>
                         <p:par>
-                          <p:cTn id="28" fill="hold">
+                          <p:cTn id="24" fill="hold">
                             <p:stCondLst>
                               <p:cond delay="0"/>
                             </p:stCondLst>
                             <p:childTnLst>
                               <p:par>
-                                <p:cTn id="29" presetID="1" presetClass="entr" presetSubtype="0" fill="hold" grpId="0" nodeType="clickEffect">
+                                <p:cTn id="25" presetID="1" presetClass="entr" presetSubtype="0" fill="hold" grpId="0" nodeType="clickEffect">
                                   <p:stCondLst>
                                     <p:cond delay="0"/>
                                   </p:stCondLst>
                                   <p:childTnLst>
                                     <p:set>
                                       <p:cBhvr>
-                                        <p:cTn id="30" dur="1" fill="hold">
+                                        <p:cTn id="26" dur="1" fill="hold">
                                           <p:stCondLst>
                                             <p:cond delay="0"/>
                                           </p:stCondLst>
@@ -10267,14 +10244,14 @@
                                 </p:cTn>
                               </p:par>
                               <p:par>
-                                <p:cTn id="31" presetID="1" presetClass="entr" presetSubtype="0" fill="hold" grpId="0" nodeType="withEffect">
+                                <p:cTn id="27" presetID="1" presetClass="entr" presetSubtype="0" fill="hold" grpId="0" nodeType="withEffect">
                                   <p:stCondLst>
                                     <p:cond delay="0"/>
                                   </p:stCondLst>
                                   <p:childTnLst>
                                     <p:set>
                                       <p:cBhvr>
-                                        <p:cTn id="32" dur="1" fill="hold">
+                                        <p:cTn id="28" dur="1" fill="hold">
                                           <p:stCondLst>
                                             <p:cond delay="0"/>
                                           </p:stCondLst>
@@ -10294,14 +10271,14 @@
                                 </p:cTn>
                               </p:par>
                               <p:par>
-                                <p:cTn id="33" presetID="1" presetClass="entr" presetSubtype="0" fill="hold" grpId="0" nodeType="withEffect">
+                                <p:cTn id="29" presetID="1" presetClass="entr" presetSubtype="0" fill="hold" grpId="0" nodeType="withEffect">
                                   <p:stCondLst>
                                     <p:cond delay="0"/>
                                   </p:stCondLst>
                                   <p:childTnLst>
                                     <p:set>
                                       <p:cBhvr>
-                                        <p:cTn id="34" dur="1" fill="hold">
+                                        <p:cTn id="30" dur="1" fill="hold">
                                           <p:stCondLst>
                                             <p:cond delay="0"/>
                                           </p:stCondLst>
@@ -10732,7 +10709,28 @@
                 <a:ea typeface="+mj-lt"/>
                 <a:cs typeface="+mj-lt"/>
               </a:rPr>
-              <a:t>Сума на елементите от масива</a:t>
+              <a:t>Сума на елементите </a:t>
+            </a:r>
+            <a:r>
+              <a:rPr lang="bg-BG" sz="3950" dirty="0">
+                <a:ea typeface="+mj-lt"/>
+                <a:cs typeface="+mj-lt"/>
+              </a:rPr>
+              <a:t>в</a:t>
+            </a:r>
+            <a:r>
+              <a:rPr lang="en-US" sz="3950" dirty="0">
+                <a:ea typeface="+mj-lt"/>
+                <a:cs typeface="+mj-lt"/>
+              </a:rPr>
+              <a:t> </a:t>
+            </a:r>
+            <a:r>
+              <a:rPr lang="bg-BG" sz="3950" dirty="0">
+                <a:ea typeface="+mj-lt"/>
+                <a:cs typeface="+mj-lt"/>
+              </a:rPr>
+              <a:t>матрица</a:t>
             </a:r>
             <a:r>
               <a:rPr lang="en-US" sz="3950" dirty="0"/>
@@ -10885,8 +10883,8 @@
         </p:nvSpPr>
         <p:spPr bwMode="auto">
           <a:xfrm>
-            <a:off x="7619673" y="3473193"/>
-            <a:ext cx="4133357" cy="896308"/>
+            <a:off x="7529673" y="3473193"/>
+            <a:ext cx="4236327" cy="896308"/>
           </a:xfrm>
           <a:prstGeom prst="wedgeRoundRectCallout">
             <a:avLst>
@@ -10992,14 +10990,14 @@
               <a:t>нулевото </a:t>
             </a:r>
             <a:r>
-              <a:rPr lang="en-US" sz="2350" b="1" dirty="0">
+              <a:rPr lang="bg-BG" sz="2350" b="1" dirty="0">
                 <a:solidFill>
                   <a:schemeClr val="bg2"/>
                 </a:solidFill>
                 <a:ea typeface="+mn-lt"/>
                 <a:cs typeface="+mn-lt"/>
               </a:rPr>
-              <a:t>измрение</a:t>
+              <a:t>измерение</a:t>
             </a:r>
             <a:r>
               <a:rPr lang="en-US" sz="2350" b="1" dirty="0">
@@ -11022,7 +11020,17 @@
                 <a:ea typeface="+mn-lt"/>
                 <a:cs typeface="+mn-lt"/>
               </a:rPr>
-              <a:t>(редици</a:t>
+              <a:t>(</a:t>
+            </a:r>
+            <a:r>
+              <a:rPr lang="bg-BG" sz="2350" b="1" dirty="0">
+                <a:solidFill>
+                  <a:srgbClr val="FFFFFF"/>
+                </a:solidFill>
+                <a:ea typeface="+mn-lt"/>
+                <a:cs typeface="+mn-lt"/>
+              </a:rPr>
+              <a:t>редове</a:t>
             </a:r>
             <a:r>
               <a:rPr lang="en-US" sz="2350" b="1" dirty="0">
@@ -11820,7 +11828,28 @@
                 <a:ea typeface="+mj-lt"/>
                 <a:cs typeface="+mj-lt"/>
               </a:rPr>
-              <a:t>Сума на елементите от масива</a:t>
+              <a:t>Сума на елементите </a:t>
+            </a:r>
+            <a:r>
+              <a:rPr lang="bg-BG" sz="3950" dirty="0">
+                <a:ea typeface="+mj-lt"/>
+                <a:cs typeface="+mj-lt"/>
+              </a:rPr>
+              <a:t>в</a:t>
+            </a:r>
+            <a:r>
+              <a:rPr lang="en-US" sz="3950" dirty="0">
+                <a:ea typeface="+mj-lt"/>
+                <a:cs typeface="+mj-lt"/>
+              </a:rPr>
+              <a:t> </a:t>
+            </a:r>
+            <a:r>
+              <a:rPr lang="bg-BG" sz="3950" dirty="0">
+                <a:ea typeface="+mj-lt"/>
+                <a:cs typeface="+mj-lt"/>
+              </a:rPr>
+              <a:t>матрица</a:t>
             </a:r>
             <a:r>
               <a:rPr lang="en-US" sz="3950" dirty="0"/>
@@ -12629,7 +12658,7 @@
         </p:nvSpPr>
         <p:spPr bwMode="auto">
           <a:xfrm>
-            <a:off x="1708371" y="3866778"/>
+            <a:off x="1861042" y="4235513"/>
             <a:ext cx="2171134" cy="1569251"/>
           </a:xfrm>
           <a:prstGeom prst="rect">
@@ -12704,7 +12733,7 @@
         </p:nvSpPr>
         <p:spPr bwMode="auto">
           <a:xfrm>
-            <a:off x="4649644" y="3497542"/>
+            <a:off x="4802315" y="3866277"/>
             <a:ext cx="609441" cy="2307723"/>
           </a:xfrm>
           <a:prstGeom prst="rect">
@@ -12795,7 +12824,7 @@
         </p:nvSpPr>
         <p:spPr>
           <a:xfrm>
-            <a:off x="4036035" y="4502655"/>
+            <a:off x="4188706" y="4871390"/>
             <a:ext cx="457081" cy="297498"/>
           </a:xfrm>
           <a:prstGeom prst="rightArrow">
@@ -12873,7 +12902,7 @@
         </p:nvSpPr>
         <p:spPr bwMode="auto">
           <a:xfrm>
-            <a:off x="6445699" y="3866778"/>
+            <a:off x="6598370" y="4235513"/>
             <a:ext cx="1223050" cy="1569251"/>
           </a:xfrm>
           <a:prstGeom prst="rect">
@@ -12954,7 +12983,7 @@
         </p:nvSpPr>
         <p:spPr bwMode="auto">
           <a:xfrm>
-            <a:off x="8438888" y="4051395"/>
+            <a:off x="8591559" y="4420130"/>
             <a:ext cx="609441" cy="1200016"/>
           </a:xfrm>
           <a:prstGeom prst="rect">
@@ -13024,7 +13053,7 @@
         </p:nvSpPr>
         <p:spPr>
           <a:xfrm>
-            <a:off x="7825278" y="4502655"/>
+            <a:off x="7977949" y="4871390"/>
             <a:ext cx="457081" cy="297498"/>
           </a:xfrm>
           <a:prstGeom prst="rightArrow">
@@ -13511,7 +13540,7 @@
                                         <p:tgtEl>
                                           <p:spTgt spid="15">
                                             <p:txEl>
-                                              <p:pRg st="0" end="0"/>
+                                              <p:pRg st="1" end="1"/>
                                             </p:txEl>
                                           </p:spTgt>
                                         </p:tgtEl>
@@ -13560,7 +13589,7 @@
                                         <p:tgtEl>
                                           <p:spTgt spid="15">
                                             <p:txEl>
-                                              <p:pRg st="1" end="1"/>
+                                              <p:pRg st="2" end="2"/>
                                             </p:txEl>
                                           </p:spTgt>
                                         </p:tgtEl>
@@ -13594,7 +13623,7 @@
                             </p:stCondLst>
                             <p:childTnLst>
                               <p:par>
-                                <p:cTn id="13" presetID="1" presetClass="entr" presetSubtype="0" fill="hold" nodeType="clickEffect">
+                                <p:cTn id="13" presetID="1" presetClass="entr" presetSubtype="0" fill="hold" grpId="0" nodeType="clickEffect">
                                   <p:stCondLst>
                                     <p:cond delay="0"/>
                                   </p:stCondLst>
@@ -13602,55 +13631,6 @@
                                     <p:set>
                                       <p:cBhvr>
                                         <p:cTn id="14" dur="1" fill="hold">
-                                          <p:stCondLst>
-                                            <p:cond delay="0"/>
-                                          </p:stCondLst>
-                                        </p:cTn>
-                                        <p:tgtEl>
-                                          <p:spTgt spid="15">
-                                            <p:txEl>
-                                              <p:pRg st="2" end="2"/>
-                                            </p:txEl>
-                                          </p:spTgt>
-                                        </p:tgtEl>
-                                        <p:attrNameLst>
-                                          <p:attrName>style.visibility</p:attrName>
-                                        </p:attrNameLst>
-                                      </p:cBhvr>
-                                      <p:to>
-                                        <p:strVal val="visible"/>
-                                      </p:to>
-                                    </p:set>
-                                  </p:childTnLst>
-                                </p:cTn>
-                              </p:par>
-                            </p:childTnLst>
-                          </p:cTn>
-                        </p:par>
-                      </p:childTnLst>
-                    </p:cTn>
-                  </p:par>
-                  <p:par>
-                    <p:cTn id="15" fill="hold">
-                      <p:stCondLst>
-                        <p:cond delay="indefinite"/>
-                      </p:stCondLst>
-                      <p:childTnLst>
-                        <p:par>
-                          <p:cTn id="16" fill="hold">
-                            <p:stCondLst>
-                              <p:cond delay="0"/>
-                            </p:stCondLst>
-                            <p:childTnLst>
-                              <p:par>
-                                <p:cTn id="17" presetID="1" presetClass="entr" presetSubtype="0" fill="hold" grpId="0" nodeType="clickEffect">
-                                  <p:stCondLst>
-                                    <p:cond delay="0"/>
-                                  </p:stCondLst>
-                                  <p:childTnLst>
-                                    <p:set>
-                                      <p:cBhvr>
-                                        <p:cTn id="18" dur="1" fill="hold">
                                           <p:stCondLst>
                                             <p:cond delay="0"/>
                                           </p:stCondLst>
@@ -13670,14 +13650,14 @@
                                 </p:cTn>
                               </p:par>
                               <p:par>
-                                <p:cTn id="19" presetID="1" presetClass="entr" presetSubtype="0" fill="hold" grpId="0" nodeType="withEffect">
+                                <p:cTn id="15" presetID="1" presetClass="entr" presetSubtype="0" fill="hold" grpId="0" nodeType="withEffect">
                                   <p:stCondLst>
                                     <p:cond delay="0"/>
                                   </p:stCondLst>
                                   <p:childTnLst>
                                     <p:set>
                                       <p:cBhvr>
-                                        <p:cTn id="20" dur="1" fill="hold">
+                                        <p:cTn id="16" dur="1" fill="hold">
                                           <p:stCondLst>
                                             <p:cond delay="0"/>
                                           </p:stCondLst>
@@ -13697,14 +13677,14 @@
                                 </p:cTn>
                               </p:par>
                               <p:par>
-                                <p:cTn id="21" presetID="1" presetClass="entr" presetSubtype="0" fill="hold" grpId="0" nodeType="withEffect">
+                                <p:cTn id="17" presetID="1" presetClass="entr" presetSubtype="0" fill="hold" grpId="0" nodeType="withEffect">
                                   <p:stCondLst>
                                     <p:cond delay="0"/>
                                   </p:stCondLst>
                                   <p:childTnLst>
                                     <p:set>
                                       <p:cBhvr>
-                                        <p:cTn id="22" dur="1" fill="hold">
+                                        <p:cTn id="18" dur="1" fill="hold">
                                           <p:stCondLst>
                                             <p:cond delay="0"/>
                                           </p:stCondLst>
@@ -13730,26 +13710,26 @@
                     </p:cTn>
                   </p:par>
                   <p:par>
-                    <p:cTn id="23" fill="hold">
+                    <p:cTn id="19" fill="hold">
                       <p:stCondLst>
                         <p:cond delay="indefinite"/>
                       </p:stCondLst>
                       <p:childTnLst>
                         <p:par>
-                          <p:cTn id="24" fill="hold">
+                          <p:cTn id="20" fill="hold">
                             <p:stCondLst>
                               <p:cond delay="0"/>
                             </p:stCondLst>
                             <p:childTnLst>
                               <p:par>
-                                <p:cTn id="25" presetID="1" presetClass="entr" presetSubtype="0" fill="hold" grpId="0" nodeType="clickEffect">
+                                <p:cTn id="21" presetID="1" presetClass="entr" presetSubtype="0" fill="hold" grpId="0" nodeType="clickEffect">
                                   <p:stCondLst>
                                     <p:cond delay="0"/>
                                   </p:stCondLst>
                                   <p:childTnLst>
                                     <p:set>
                                       <p:cBhvr>
-                                        <p:cTn id="26" dur="1" fill="hold">
+                                        <p:cTn id="22" dur="1" fill="hold">
                                           <p:stCondLst>
                                             <p:cond delay="0"/>
                                           </p:stCondLst>
@@ -13769,14 +13749,14 @@
                                 </p:cTn>
                               </p:par>
                               <p:par>
-                                <p:cTn id="27" presetID="1" presetClass="entr" presetSubtype="0" fill="hold" grpId="0" nodeType="withEffect">
+                                <p:cTn id="23" presetID="1" presetClass="entr" presetSubtype="0" fill="hold" grpId="0" nodeType="withEffect">
                                   <p:stCondLst>
                                     <p:cond delay="0"/>
                                   </p:stCondLst>
                                   <p:childTnLst>
                                     <p:set>
                                       <p:cBhvr>
-                                        <p:cTn id="28" dur="1" fill="hold">
+                                        <p:cTn id="24" dur="1" fill="hold">
                                           <p:stCondLst>
                                             <p:cond delay="0"/>
                                           </p:stCondLst>
@@ -13796,14 +13776,14 @@
                                 </p:cTn>
                               </p:par>
                               <p:par>
-                                <p:cTn id="29" presetID="1" presetClass="entr" presetSubtype="0" fill="hold" grpId="0" nodeType="withEffect">
+                                <p:cTn id="25" presetID="1" presetClass="entr" presetSubtype="0" fill="hold" grpId="0" nodeType="withEffect">
                                   <p:stCondLst>
                                     <p:cond delay="0"/>
                                   </p:stCondLst>
                                   <p:childTnLst>
                                     <p:set>
                                       <p:cBhvr>
-                                        <p:cTn id="30" dur="1" fill="hold">
+                                        <p:cTn id="26" dur="1" fill="hold">
                                           <p:stCondLst>
                                             <p:cond delay="0"/>
                                           </p:stCondLst>
@@ -15415,7 +15395,15 @@
             <a:pPr algn="ctr"/>
             <a:r>
               <a:rPr lang="en-US" sz="1950" dirty="0"/>
-              <a:t>Тествайте решението в Judge: </a:t>
+              <a:t>Тествайте решението</a:t>
+            </a:r>
+            <a:r>
+              <a:rPr lang="bg-BG" sz="1950" dirty="0"/>
+              <a:t> си</a:t>
+            </a:r>
+            <a:r>
+              <a:rPr lang="en-US" sz="1950" dirty="0"/>
+              <a:t> в Judge: </a:t>
             </a:r>
             <a:r>
               <a:rPr lang="en-US" sz="1950" dirty="0">
@@ -15743,7 +15731,7 @@
           <a:p>
             <a:r>
               <a:rPr lang="en-US" sz="3950" dirty="0"/>
-              <a:t>Задача: Квадрата с най-голяма сума</a:t>
+              <a:t>Задача: Квадрат с най-голяма сума</a:t>
             </a:r>
           </a:p>
         </p:txBody>
@@ -15758,7 +15746,7 @@
         </p:nvSpPr>
         <p:spPr bwMode="auto">
           <a:xfrm>
-            <a:off x="1371000" y="4374000"/>
+            <a:off x="1371000" y="4640513"/>
             <a:ext cx="3770918" cy="1938487"/>
           </a:xfrm>
           <a:prstGeom prst="rect">
@@ -15880,7 +15868,7 @@
         </p:nvSpPr>
         <p:spPr bwMode="auto">
           <a:xfrm>
-            <a:off x="5994251" y="4748648"/>
+            <a:off x="5994251" y="5015161"/>
             <a:ext cx="761802" cy="1200016"/>
           </a:xfrm>
           <a:prstGeom prst="rect">
@@ -15977,7 +15965,7 @@
         </p:nvSpPr>
         <p:spPr>
           <a:xfrm>
-            <a:off x="5339544" y="5194494"/>
+            <a:off x="5339544" y="5461007"/>
             <a:ext cx="457081" cy="297498"/>
           </a:xfrm>
           <a:prstGeom prst="rightArrow">
@@ -16381,7 +16369,23 @@
                   <a:srgbClr val="234465"/>
                 </a:solidFill>
               </a:rPr>
-              <a:t>с най-голяма сума </a:t>
+              <a:t>с най-голяма сума</a:t>
+            </a:r>
+            <a:r>
+              <a:rPr lang="bg-BG" sz="3600" dirty="0">
+                <a:solidFill>
+                  <a:srgbClr val="234465"/>
+                </a:solidFill>
+              </a:rPr>
+              <a:t> в матрица</a:t>
+            </a:r>
+            <a:r>
+              <a:rPr lang="en-US" sz="3600" dirty="0">
+                <a:solidFill>
+                  <a:srgbClr val="234465"/>
+                </a:solidFill>
+              </a:rPr>
+              <a:t> </a:t>
             </a:r>
             <a:r>
               <a:rPr lang="en-US" sz="3600" b="1" dirty="0">
@@ -16530,7 +16534,7 @@
                                         <p:tgtEl>
                                           <p:spTgt spid="12">
                                             <p:txEl>
-                                              <p:pRg st="0" end="0"/>
+                                              <p:pRg st="2" end="2"/>
                                             </p:txEl>
                                           </p:spTgt>
                                         </p:tgtEl>
@@ -16579,7 +16583,7 @@
                                         <p:tgtEl>
                                           <p:spTgt spid="12">
                                             <p:txEl>
-                                              <p:pRg st="1" end="1"/>
+                                              <p:pRg st="3" end="3"/>
                                             </p:txEl>
                                           </p:spTgt>
                                         </p:tgtEl>
@@ -16613,7 +16617,7 @@
                             </p:stCondLst>
                             <p:childTnLst>
                               <p:par>
-                                <p:cTn id="13" presetID="1" presetClass="entr" presetSubtype="0" fill="hold" nodeType="clickEffect">
+                                <p:cTn id="13" presetID="1" presetClass="entr" presetSubtype="0" fill="hold" grpId="0" nodeType="clickEffect">
                                   <p:stCondLst>
                                     <p:cond delay="0"/>
                                   </p:stCondLst>
@@ -16621,104 +16625,6 @@
                                     <p:set>
                                       <p:cBhvr>
                                         <p:cTn id="14" dur="1" fill="hold">
-                                          <p:stCondLst>
-                                            <p:cond delay="0"/>
-                                          </p:stCondLst>
-                                        </p:cTn>
-                                        <p:tgtEl>
-                                          <p:spTgt spid="12">
-                                            <p:txEl>
-                                              <p:pRg st="2" end="2"/>
-                                            </p:txEl>
-                                          </p:spTgt>
-                                        </p:tgtEl>
-                                        <p:attrNameLst>
-                                          <p:attrName>style.visibility</p:attrName>
-                                        </p:attrNameLst>
-                                      </p:cBhvr>
-                                      <p:to>
-                                        <p:strVal val="visible"/>
-                                      </p:to>
-                                    </p:set>
-                                  </p:childTnLst>
-                                </p:cTn>
-                              </p:par>
-                            </p:childTnLst>
-                          </p:cTn>
-                        </p:par>
-                      </p:childTnLst>
-                    </p:cTn>
-                  </p:par>
-                  <p:par>
-                    <p:cTn id="15" fill="hold">
-                      <p:stCondLst>
-                        <p:cond delay="indefinite"/>
-                      </p:stCondLst>
-                      <p:childTnLst>
-                        <p:par>
-                          <p:cTn id="16" fill="hold">
-                            <p:stCondLst>
-                              <p:cond delay="0"/>
-                            </p:stCondLst>
-                            <p:childTnLst>
-                              <p:par>
-                                <p:cTn id="17" presetID="1" presetClass="entr" presetSubtype="0" fill="hold" nodeType="clickEffect">
-                                  <p:stCondLst>
-                                    <p:cond delay="0"/>
-                                  </p:stCondLst>
-                                  <p:childTnLst>
-                                    <p:set>
-                                      <p:cBhvr>
-                                        <p:cTn id="18" dur="1" fill="hold">
-                                          <p:stCondLst>
-                                            <p:cond delay="0"/>
-                                          </p:stCondLst>
-                                        </p:cTn>
-                                        <p:tgtEl>
-                                          <p:spTgt spid="12">
-                                            <p:txEl>
-                                              <p:pRg st="3" end="3"/>
-                                            </p:txEl>
-                                          </p:spTgt>
-                                        </p:tgtEl>
-                                        <p:attrNameLst>
-                                          <p:attrName>style.visibility</p:attrName>
-                                        </p:attrNameLst>
-                                      </p:cBhvr>
-                                      <p:to>
-                                        <p:strVal val="visible"/>
-                                      </p:to>
-                                    </p:set>
-                                  </p:childTnLst>
-                                </p:cTn>
-                              </p:par>
-                            </p:childTnLst>
-                          </p:cTn>
-                        </p:par>
-                      </p:childTnLst>
-                    </p:cTn>
-                  </p:par>
-                  <p:par>
-                    <p:cTn id="19" fill="hold">
-                      <p:stCondLst>
-                        <p:cond delay="indefinite"/>
-                      </p:stCondLst>
-                      <p:childTnLst>
-                        <p:par>
-                          <p:cTn id="20" fill="hold">
-                            <p:stCondLst>
-                              <p:cond delay="0"/>
-                            </p:stCondLst>
-                            <p:childTnLst>
-                              <p:par>
-                                <p:cTn id="21" presetID="1" presetClass="entr" presetSubtype="0" fill="hold" grpId="0" nodeType="clickEffect">
-                                  <p:stCondLst>
-                                    <p:cond delay="0"/>
-                                  </p:stCondLst>
-                                  <p:childTnLst>
-                                    <p:set>
-                                      <p:cBhvr>
-                                        <p:cTn id="22" dur="1" fill="hold">
                                           <p:stCondLst>
                                             <p:cond delay="0"/>
                                           </p:stCondLst>
@@ -16738,14 +16644,14 @@
                                 </p:cTn>
                               </p:par>
                               <p:par>
-                                <p:cTn id="23" presetID="1" presetClass="entr" presetSubtype="0" fill="hold" grpId="0" nodeType="withEffect">
+                                <p:cTn id="15" presetID="1" presetClass="entr" presetSubtype="0" fill="hold" grpId="0" nodeType="withEffect">
                                   <p:stCondLst>
                                     <p:cond delay="0"/>
                                   </p:stCondLst>
                                   <p:childTnLst>
                                     <p:set>
                                       <p:cBhvr>
-                                        <p:cTn id="24" dur="1" fill="hold">
+                                        <p:cTn id="16" dur="1" fill="hold">
                                           <p:stCondLst>
                                             <p:cond delay="0"/>
                                           </p:stCondLst>
@@ -16765,14 +16671,14 @@
                                 </p:cTn>
                               </p:par>
                               <p:par>
-                                <p:cTn id="25" presetID="1" presetClass="entr" presetSubtype="0" fill="hold" grpId="0" nodeType="withEffect">
+                                <p:cTn id="17" presetID="1" presetClass="entr" presetSubtype="0" fill="hold" grpId="0" nodeType="withEffect">
                                   <p:stCondLst>
                                     <p:cond delay="0"/>
                                   </p:stCondLst>
                                   <p:childTnLst>
                                     <p:set>
                                       <p:cBhvr>
-                                        <p:cTn id="26" dur="1" fill="hold">
+                                        <p:cTn id="18" dur="1" fill="hold">
                                           <p:stCondLst>
                                             <p:cond delay="0"/>
                                           </p:stCondLst>
@@ -16870,7 +16776,7 @@
                 <a:ea typeface="+mj-lt"/>
                 <a:cs typeface="+mj-lt"/>
               </a:rPr>
-              <a:t>Квадрата с най-голяма сума</a:t>
+              <a:t>Квадрат с най-голяма сума</a:t>
             </a:r>
             <a:endParaRPr lang="en-US" sz="3950" b="0" dirty="0">
               <a:ea typeface="+mj-lt"/>
@@ -17051,7 +16957,25 @@
                 </a:solidFill>
                 <a:latin typeface="Consolas"/>
               </a:rPr>
-              <a:t> TODO: Да се прочете входа от конзолата</a:t>
+              <a:t> TODO: </a:t>
+            </a:r>
+            <a:r>
+              <a:rPr lang="bg-BG" sz="2350" noProof="1">
+                <a:solidFill>
+                  <a:schemeClr val="accent2"/>
+                </a:solidFill>
+                <a:latin typeface="Consolas"/>
+              </a:rPr>
+              <a:t>Прочетете </a:t>
+            </a:r>
+            <a:r>
+              <a:rPr lang="en-US" sz="2350" noProof="1">
+                <a:solidFill>
+                  <a:schemeClr val="accent2"/>
+                </a:solidFill>
+                <a:latin typeface="Consolas"/>
+              </a:rPr>
+              <a:t>входа от конзолата</a:t>
             </a:r>
             <a:endParaRPr lang="en-US" sz="2350" i="1" noProof="1">
               <a:solidFill>
@@ -17229,7 +17153,25 @@
                 </a:solidFill>
                 <a:latin typeface="Consolas"/>
               </a:rPr>
-              <a:t> Да се провери дали сумата е по-голама</a:t>
+              <a:t> </a:t>
+            </a:r>
+            <a:r>
+              <a:rPr lang="bg-BG" sz="2350" i="1" noProof="1">
+                <a:solidFill>
+                  <a:schemeClr val="accent2"/>
+                </a:solidFill>
+                <a:latin typeface="Consolas"/>
+              </a:rPr>
+              <a:t>Проверете </a:t>
+            </a:r>
+            <a:r>
+              <a:rPr lang="en-US" sz="2350" i="1" noProof="1">
+                <a:solidFill>
+                  <a:schemeClr val="accent2"/>
+                </a:solidFill>
+                <a:latin typeface="Consolas"/>
+              </a:rPr>
+              <a:t>дали сумата е по-голама</a:t>
             </a:r>
           </a:p>
           <a:p>
@@ -17286,7 +17228,25 @@
                 </a:solidFill>
                 <a:latin typeface="Consolas"/>
               </a:rPr>
-              <a:t>// TODO: Да се отпечата квадрата и сумата му</a:t>
+              <a:t>// TODO: </a:t>
+            </a:r>
+            <a:r>
+              <a:rPr lang="bg-BG" sz="2350" noProof="1">
+                <a:solidFill>
+                  <a:schemeClr val="accent2"/>
+                </a:solidFill>
+                <a:latin typeface="Consolas"/>
+              </a:rPr>
+              <a:t>Отпечатайте </a:t>
+            </a:r>
+            <a:r>
+              <a:rPr lang="en-US" sz="2350" noProof="1">
+                <a:solidFill>
+                  <a:schemeClr val="accent2"/>
+                </a:solidFill>
+                <a:latin typeface="Consolas"/>
+              </a:rPr>
+              <a:t>квадрата и сумата му</a:t>
             </a:r>
             <a:r>
               <a:rPr lang="en-US" sz="2350" noProof="1">
@@ -17466,7 +17426,21 @@
                 <a:ea typeface="+mn-lt"/>
                 <a:cs typeface="+mn-lt"/>
               </a:rPr>
-              <a:t>Тествайте решението в Judge</a:t>
+              <a:t>Тествайте решението </a:t>
+            </a:r>
+            <a:r>
+              <a:rPr lang="bg-BG" sz="1950" dirty="0">
+                <a:ea typeface="+mn-lt"/>
+                <a:cs typeface="+mn-lt"/>
+              </a:rPr>
+              <a:t>си </a:t>
+            </a:r>
+            <a:r>
+              <a:rPr lang="en-US" sz="1950" dirty="0">
+                <a:ea typeface="+mn-lt"/>
+                <a:cs typeface="+mn-lt"/>
+              </a:rPr>
+              <a:t>в Judge</a:t>
             </a:r>
             <a:r>
               <a:rPr lang="en-US" sz="1950" dirty="0"/>
@@ -18299,11 +18273,23 @@
                   <a:schemeClr val="bg1"/>
                 </a:solidFill>
               </a:rPr>
-              <a:t>Назъбеният масив </a:t>
+              <a:t>Назъбен масив </a:t>
+            </a:r>
+            <a:r>
+              <a:rPr lang="bg-BG" sz="3350" dirty="0"/>
+              <a:t>==</a:t>
             </a:r>
             <a:r>
               <a:rPr lang="en-US" sz="3350" dirty="0"/>
-              <a:t>е многоизмерен масив</a:t>
+              <a:t> </a:t>
+            </a:r>
+            <a:r>
+              <a:rPr lang="bg-BG" sz="3350" dirty="0"/>
+              <a:t>многомерен</a:t>
+            </a:r>
+            <a:r>
+              <a:rPr lang="en-US" sz="3350" dirty="0"/>
+              <a:t> масив</a:t>
             </a:r>
             <a:r>
               <a:rPr lang="bg-BG" sz="3350" dirty="0"/>
@@ -18311,9 +18297,20 @@
             </a:r>
             <a:r>
               <a:rPr lang="en-US" sz="3150" dirty="0"/>
-              <a:t>о всяко измерение има различна дължина</a:t>
-            </a:r>
-            <a:endParaRPr lang="en-US" sz="3150" dirty="0">
+              <a:t>о всяко измерение има </a:t>
+            </a:r>
+            <a:r>
+              <a:rPr lang="en-US" sz="3150" b="1" dirty="0">
+                <a:solidFill>
+                  <a:schemeClr val="bg1"/>
+                </a:solidFill>
+              </a:rPr>
+              <a:t>различна дължина</a:t>
+            </a:r>
+            <a:endParaRPr lang="en-US" sz="3150" b="1" dirty="0">
+              <a:solidFill>
+                <a:schemeClr val="bg1"/>
+              </a:solidFill>
               <a:cs typeface="Calibri"/>
             </a:endParaRPr>
           </a:p>
@@ -18425,8 +18422,11 @@
                 <a:spcPct val="100000"/>
               </a:lnSpc>
               <a:spcBef>
-                <a:spcPts val="1200"/>
+                <a:spcPts val="1600"/>
               </a:spcBef>
+              <a:spcAft>
+                <a:spcPts val="200"/>
+              </a:spcAft>
               <a:buClr>
                 <a:srgbClr val="234465"/>
               </a:buClr>
@@ -18488,7 +18488,10 @@
               <a:rPr lang="en-US" sz="3950" dirty="0"/>
               <a:t>Какво е назъбен масив</a:t>
             </a:r>
-            <a:endParaRPr lang="bg-BG" sz="3950" dirty="0"/>
+            <a:r>
+              <a:rPr lang="bg-BG" sz="3950" dirty="0"/>
+              <a:t>?</a:t>
+            </a:r>
           </a:p>
         </p:txBody>
       </p:sp>
@@ -18755,9 +18758,27 @@
                   <a:srgbClr val="FFFFFF"/>
                 </a:solidFill>
               </a:rPr>
-              <a:t>Индекс на редицата</a:t>
-            </a:r>
-            <a:endParaRPr lang="bg-BG" dirty="0"/>
+              <a:t>Индекс на </a:t>
+            </a:r>
+            <a:r>
+              <a:rPr lang="en-US" sz="2350" b="1" dirty="0">
+                <a:solidFill>
+                  <a:schemeClr val="bg1">
+                    <a:lumMod val="60000"/>
+                    <a:lumOff val="40000"/>
+                  </a:schemeClr>
+                </a:solidFill>
+              </a:rPr>
+              <a:t>редицата</a:t>
+            </a:r>
+            <a:endParaRPr lang="bg-BG" dirty="0">
+              <a:solidFill>
+                <a:schemeClr val="bg1">
+                  <a:lumMod val="60000"/>
+                  <a:lumOff val="40000"/>
+                </a:schemeClr>
+              </a:solidFill>
+            </a:endParaRPr>
           </a:p>
         </p:txBody>
       </p:sp>
@@ -18834,9 +18855,27 @@
                   <a:srgbClr val="FFFFFF"/>
                 </a:solidFill>
               </a:rPr>
-              <a:t>Индекс на колоната</a:t>
-            </a:r>
-            <a:endParaRPr lang="bg-BG" dirty="0"/>
+              <a:t>Индекс на </a:t>
+            </a:r>
+            <a:r>
+              <a:rPr lang="en-US" sz="2350" b="1" dirty="0">
+                <a:solidFill>
+                  <a:schemeClr val="bg1">
+                    <a:lumMod val="60000"/>
+                    <a:lumOff val="40000"/>
+                  </a:schemeClr>
+                </a:solidFill>
+              </a:rPr>
+              <a:t>колоната</a:t>
+            </a:r>
+            <a:endParaRPr lang="bg-BG" dirty="0">
+              <a:solidFill>
+                <a:schemeClr val="bg1">
+                  <a:lumMod val="60000"/>
+                  <a:lumOff val="40000"/>
+                </a:schemeClr>
+              </a:solidFill>
+            </a:endParaRPr>
           </a:p>
         </p:txBody>
       </p:sp>
@@ -19024,7 +19063,7 @@
                                         <p:tgtEl>
                                           <p:spTgt spid="6">
                                             <p:txEl>
-                                              <p:pRg st="0" end="0"/>
+                                              <p:pRg st="2" end="2"/>
                                             </p:txEl>
                                           </p:spTgt>
                                         </p:tgtEl>
@@ -19058,7 +19097,7 @@
                             </p:stCondLst>
                             <p:childTnLst>
                               <p:par>
-                                <p:cTn id="9" presetID="1" presetClass="entr" presetSubtype="0" fill="hold" nodeType="clickEffect">
+                                <p:cTn id="9" presetID="1" presetClass="entr" presetSubtype="0" fill="hold" grpId="0" nodeType="clickEffect">
                                   <p:stCondLst>
                                     <p:cond delay="0"/>
                                   </p:stCondLst>
@@ -19071,11 +19110,7 @@
                                           </p:stCondLst>
                                         </p:cTn>
                                         <p:tgtEl>
-                                          <p:spTgt spid="6">
-                                            <p:txEl>
-                                              <p:pRg st="1" end="1"/>
-                                            </p:txEl>
-                                          </p:spTgt>
+                                          <p:spTgt spid="18"/>
                                         </p:tgtEl>
                                         <p:attrNameLst>
                                           <p:attrName>style.visibility</p:attrName>
@@ -19122,7 +19157,7 @@
                                         <p:tgtEl>
                                           <p:spTgt spid="6">
                                             <p:txEl>
-                                              <p:pRg st="2" end="2"/>
+                                              <p:pRg st="5" end="5"/>
                                             </p:txEl>
                                           </p:spTgt>
                                         </p:tgtEl>
@@ -19169,7 +19204,7 @@
                                           </p:stCondLst>
                                         </p:cTn>
                                         <p:tgtEl>
-                                          <p:spTgt spid="18"/>
+                                          <p:spTgt spid="7"/>
                                         </p:tgtEl>
                                         <p:attrNameLst>
                                           <p:attrName>style.visibility</p:attrName>
@@ -19201,7 +19236,7 @@
                             </p:stCondLst>
                             <p:childTnLst>
                               <p:par>
-                                <p:cTn id="21" presetID="1" presetClass="entr" presetSubtype="0" fill="hold" nodeType="clickEffect">
+                                <p:cTn id="21" presetID="1" presetClass="entr" presetSubtype="0" fill="hold" grpId="0" nodeType="clickEffect">
                                   <p:stCondLst>
                                     <p:cond delay="0"/>
                                   </p:stCondLst>
@@ -19214,11 +19249,7 @@
                                           </p:stCondLst>
                                         </p:cTn>
                                         <p:tgtEl>
-                                          <p:spTgt spid="6">
-                                            <p:txEl>
-                                              <p:pRg st="5" end="5"/>
-                                            </p:txEl>
-                                          </p:spTgt>
+                                          <p:spTgt spid="8"/>
                                         </p:tgtEl>
                                         <p:attrNameLst>
                                           <p:attrName>style.visibility</p:attrName>
@@ -19258,96 +19289,6 @@
                                     <p:set>
                                       <p:cBhvr>
                                         <p:cTn id="26" dur="1" fill="hold">
-                                          <p:stCondLst>
-                                            <p:cond delay="0"/>
-                                          </p:stCondLst>
-                                        </p:cTn>
-                                        <p:tgtEl>
-                                          <p:spTgt spid="7"/>
-                                        </p:tgtEl>
-                                        <p:attrNameLst>
-                                          <p:attrName>style.visibility</p:attrName>
-                                        </p:attrNameLst>
-                                      </p:cBhvr>
-                                      <p:to>
-                                        <p:strVal val="visible"/>
-                                      </p:to>
-                                    </p:set>
-                                  </p:childTnLst>
-                                </p:cTn>
-                              </p:par>
-                            </p:childTnLst>
-                          </p:cTn>
-                        </p:par>
-                      </p:childTnLst>
-                    </p:cTn>
-                  </p:par>
-                  <p:par>
-                    <p:cTn id="27" fill="hold">
-                      <p:stCondLst>
-                        <p:cond delay="indefinite"/>
-                      </p:stCondLst>
-                      <p:childTnLst>
-                        <p:par>
-                          <p:cTn id="28" fill="hold">
-                            <p:stCondLst>
-                              <p:cond delay="0"/>
-                            </p:stCondLst>
-                            <p:childTnLst>
-                              <p:par>
-                                <p:cTn id="29" presetID="1" presetClass="entr" presetSubtype="0" fill="hold" grpId="0" nodeType="clickEffect">
-                                  <p:stCondLst>
-                                    <p:cond delay="0"/>
-                                  </p:stCondLst>
-                                  <p:childTnLst>
-                                    <p:set>
-                                      <p:cBhvr>
-                                        <p:cTn id="30" dur="1" fill="hold">
-                                          <p:stCondLst>
-                                            <p:cond delay="0"/>
-                                          </p:stCondLst>
-                                        </p:cTn>
-                                        <p:tgtEl>
-                                          <p:spTgt spid="8"/>
-                                        </p:tgtEl>
-                                        <p:attrNameLst>
-                                          <p:attrName>style.visibility</p:attrName>
-                                        </p:attrNameLst>
-                                      </p:cBhvr>
-                                      <p:to>
-                                        <p:strVal val="visible"/>
-                                      </p:to>
-                                    </p:set>
-                                  </p:childTnLst>
-                                </p:cTn>
-                              </p:par>
-                            </p:childTnLst>
-                          </p:cTn>
-                        </p:par>
-                      </p:childTnLst>
-                    </p:cTn>
-                  </p:par>
-                  <p:par>
-                    <p:cTn id="31" fill="hold">
-                      <p:stCondLst>
-                        <p:cond delay="indefinite"/>
-                      </p:stCondLst>
-                      <p:childTnLst>
-                        <p:par>
-                          <p:cTn id="32" fill="hold">
-                            <p:stCondLst>
-                              <p:cond delay="0"/>
-                            </p:stCondLst>
-                            <p:childTnLst>
-                              <p:par>
-                                <p:cTn id="33" presetID="1" presetClass="entr" presetSubtype="0" fill="hold" grpId="0" nodeType="clickEffect">
-                                  <p:stCondLst>
-                                    <p:cond delay="0"/>
-                                  </p:stCondLst>
-                                  <p:childTnLst>
-                                    <p:set>
-                                      <p:cBhvr>
-                                        <p:cTn id="34" dur="1" fill="hold">
                                           <p:stCondLst>
                                             <p:cond delay="0"/>
                                           </p:stCondLst>
@@ -19452,6 +19393,14 @@
               </a:buClr>
             </a:pPr>
             <a:r>
+              <a:rPr lang="bg-BG" sz="3550" dirty="0">
+                <a:solidFill>
+                  <a:schemeClr val="bg1"/>
+                </a:solidFill>
+              </a:rPr>
+              <a:t>͏</a:t>
+            </a:r>
+            <a:r>
               <a:rPr lang="en-GB" sz="3550" b="1" dirty="0">
                 <a:solidFill>
                   <a:schemeClr val="bg1"/>
@@ -19518,16 +19467,48 @@
               </a:buClr>
             </a:pPr>
             <a:r>
+              <a:rPr lang="bg-BG" sz="3550" dirty="0">
+                <a:solidFill>
+                  <a:schemeClr val="bg1"/>
+                </a:solidFill>
+              </a:rPr>
+              <a:t>͏</a:t>
+            </a:r>
+            <a:r>
               <a:rPr lang="en-US" sz="3550" b="1" dirty="0">
                 <a:solidFill>
                   <a:schemeClr val="bg1"/>
                 </a:solidFill>
               </a:rPr>
-              <a:t>Назъбени матрици </a:t>
+              <a:t>Назъбени </a:t>
+            </a:r>
+            <a:r>
+              <a:rPr lang="bg-BG" sz="3550" b="1" dirty="0">
+                <a:solidFill>
+                  <a:schemeClr val="bg1"/>
+                </a:solidFill>
+              </a:rPr>
+              <a:t>масиви</a:t>
+            </a:r>
+            <a:r>
+              <a:rPr lang="en-US" sz="3550" b="1" dirty="0">
+                <a:solidFill>
+                  <a:schemeClr val="bg1"/>
+                </a:solidFill>
+              </a:rPr>
+              <a:t> </a:t>
             </a:r>
             <a:r>
               <a:rPr lang="en-US" sz="3550" dirty="0"/>
-              <a:t>(Масив от масиви)</a:t>
+              <a:t>(</a:t>
+            </a:r>
+            <a:r>
+              <a:rPr lang="bg-BG" sz="3550" dirty="0"/>
+              <a:t>м</a:t>
+            </a:r>
+            <a:r>
+              <a:rPr lang="en-US" sz="3550" dirty="0"/>
+              <a:t>асив от масиви)</a:t>
             </a:r>
             <a:endParaRPr lang="en-US" sz="3550" dirty="0">
               <a:cs typeface="Calibri"/>
@@ -19906,33 +19887,15 @@
                                   </p:childTnLst>
                                 </p:cTn>
                               </p:par>
-                            </p:childTnLst>
-                          </p:cTn>
-                        </p:par>
-                      </p:childTnLst>
-                    </p:cTn>
-                  </p:par>
-                  <p:par>
-                    <p:cTn id="15" fill="hold">
-                      <p:stCondLst>
-                        <p:cond delay="indefinite"/>
-                      </p:stCondLst>
-                      <p:childTnLst>
-                        <p:par>
-                          <p:cTn id="16" fill="hold">
-                            <p:stCondLst>
-                              <p:cond delay="0"/>
-                            </p:stCondLst>
-                            <p:childTnLst>
                               <p:par>
-                                <p:cTn id="17" presetID="1" presetClass="entr" presetSubtype="0" fill="hold" nodeType="clickEffect">
+                                <p:cTn id="15" presetID="1" presetClass="entr" presetSubtype="0" fill="hold" nodeType="withEffect">
                                   <p:stCondLst>
                                     <p:cond delay="0"/>
                                   </p:stCondLst>
                                   <p:childTnLst>
                                     <p:set>
                                       <p:cBhvr>
-                                        <p:cTn id="18" dur="1" fill="hold">
+                                        <p:cTn id="16" dur="1" fill="hold">
                                           <p:stCondLst>
                                             <p:cond delay="0"/>
                                           </p:stCondLst>
@@ -19962,26 +19925,26 @@
                     </p:cTn>
                   </p:par>
                   <p:par>
-                    <p:cTn id="19" fill="hold">
+                    <p:cTn id="17" fill="hold">
                       <p:stCondLst>
                         <p:cond delay="indefinite"/>
                       </p:stCondLst>
                       <p:childTnLst>
                         <p:par>
-                          <p:cTn id="20" fill="hold">
+                          <p:cTn id="18" fill="hold">
                             <p:stCondLst>
                               <p:cond delay="0"/>
                             </p:stCondLst>
                             <p:childTnLst>
                               <p:par>
-                                <p:cTn id="21" presetID="1" presetClass="entr" presetSubtype="0" fill="hold" nodeType="clickEffect">
+                                <p:cTn id="19" presetID="1" presetClass="entr" presetSubtype="0" fill="hold" nodeType="clickEffect">
                                   <p:stCondLst>
                                     <p:cond delay="0"/>
                                   </p:stCondLst>
                                   <p:childTnLst>
                                     <p:set>
                                       <p:cBhvr>
-                                        <p:cTn id="22" dur="1" fill="hold">
+                                        <p:cTn id="20" dur="1" fill="hold">
                                           <p:stCondLst>
                                             <p:cond delay="0"/>
                                           </p:stCondLst>
@@ -20011,26 +19974,26 @@
                     </p:cTn>
                   </p:par>
                   <p:par>
-                    <p:cTn id="23" fill="hold">
+                    <p:cTn id="21" fill="hold">
                       <p:stCondLst>
                         <p:cond delay="indefinite"/>
                       </p:stCondLst>
                       <p:childTnLst>
                         <p:par>
-                          <p:cTn id="24" fill="hold">
+                          <p:cTn id="22" fill="hold">
                             <p:stCondLst>
                               <p:cond delay="0"/>
                             </p:stCondLst>
                             <p:childTnLst>
                               <p:par>
-                                <p:cTn id="25" presetID="1" presetClass="entr" presetSubtype="0" fill="hold" nodeType="clickEffect">
+                                <p:cTn id="23" presetID="1" presetClass="entr" presetSubtype="0" fill="hold" nodeType="clickEffect">
                                   <p:stCondLst>
                                     <p:cond delay="0"/>
                                   </p:stCondLst>
                                   <p:childTnLst>
                                     <p:set>
                                       <p:cBhvr>
-                                        <p:cTn id="26" dur="1" fill="hold">
+                                        <p:cTn id="24" dur="1" fill="hold">
                                           <p:stCondLst>
                                             <p:cond delay="0"/>
                                           </p:stCondLst>
@@ -20736,12 +20699,30 @@
               </a:buClr>
             </a:pPr>
             <a:r>
+              <a:rPr lang="en-GB" sz="3400" b="1" dirty="0">
+                <a:solidFill>
+                  <a:schemeClr val="bg1"/>
+                </a:solidFill>
+                <a:latin typeface="Consolas" panose="020B0609020204030204" pitchFamily="49" charset="0"/>
+                <a:cs typeface="Consolas" panose="020B0609020204030204" pitchFamily="49" charset="0"/>
+              </a:rPr>
+              <a:t>For</a:t>
+            </a:r>
+            <a:r>
+              <a:rPr lang="en-GB" sz="3400" b="1" dirty="0">
+                <a:solidFill>
+                  <a:schemeClr val="bg1"/>
+                </a:solidFill>
+              </a:rPr>
+              <a:t>-цикъл</a:t>
+            </a:r>
+            <a:r>
               <a:rPr lang="en-GB" sz="3350" b="1" dirty="0">
                 <a:solidFill>
                   <a:schemeClr val="bg1"/>
                 </a:solidFill>
               </a:rPr>
-              <a:t>For-цикъл </a:t>
+              <a:t> </a:t>
             </a:r>
             <a:endParaRPr lang="bg-BG" dirty="0">
               <a:solidFill>
@@ -20792,14 +20773,24 @@
               </a:buClr>
             </a:pPr>
             <a:r>
-              <a:rPr lang="en-GB" sz="3350" b="1" dirty="0">
+              <a:rPr lang="en-GB" sz="3400" b="1" dirty="0">
                 <a:solidFill>
                   <a:schemeClr val="bg1"/>
                 </a:solidFill>
-              </a:rPr>
-              <a:t>Foreach-цикъл</a:t>
-            </a:r>
-            <a:endParaRPr lang="en-GB" sz="3350" b="1" dirty="0">
+                <a:latin typeface="Consolas" panose="020B0609020204030204" pitchFamily="49" charset="0"/>
+                <a:cs typeface="Consolas" panose="020B0609020204030204" pitchFamily="49" charset="0"/>
+              </a:rPr>
+              <a:t>Foreach</a:t>
+            </a:r>
+            <a:r>
+              <a:rPr lang="en-GB" sz="3400" b="1" dirty="0">
+                <a:solidFill>
+                  <a:schemeClr val="bg1"/>
+                </a:solidFill>
+              </a:rPr>
+              <a:t>-цикъл</a:t>
+            </a:r>
+            <a:endParaRPr lang="en-GB" sz="3400" b="1" dirty="0">
               <a:solidFill>
                 <a:schemeClr val="bg1"/>
               </a:solidFill>
@@ -20868,7 +20859,7 @@
         </p:nvSpPr>
         <p:spPr bwMode="auto">
           <a:xfrm>
-            <a:off x="666322" y="1772817"/>
+            <a:off x="666322" y="1805513"/>
             <a:ext cx="9102086" cy="1938487"/>
           </a:xfrm>
           <a:prstGeom prst="rect">
@@ -21258,55 +21249,6 @@
                                           </p:stCondLst>
                                         </p:cTn>
                                         <p:tgtEl>
-                                          <p:spTgt spid="6">
-                                            <p:txEl>
-                                              <p:pRg st="0" end="0"/>
-                                            </p:txEl>
-                                          </p:spTgt>
-                                        </p:tgtEl>
-                                        <p:attrNameLst>
-                                          <p:attrName>style.visibility</p:attrName>
-                                        </p:attrNameLst>
-                                      </p:cBhvr>
-                                      <p:to>
-                                        <p:strVal val="visible"/>
-                                      </p:to>
-                                    </p:set>
-                                  </p:childTnLst>
-                                </p:cTn>
-                              </p:par>
-                            </p:childTnLst>
-                          </p:cTn>
-                        </p:par>
-                      </p:childTnLst>
-                    </p:cTn>
-                  </p:par>
-                  <p:par>
-                    <p:cTn id="7" fill="hold">
-                      <p:stCondLst>
-                        <p:cond delay="indefinite"/>
-                      </p:stCondLst>
-                      <p:childTnLst>
-                        <p:par>
-                          <p:cTn id="8" fill="hold">
-                            <p:stCondLst>
-                              <p:cond delay="0"/>
-                            </p:stCondLst>
-                            <p:childTnLst>
-                              <p:par>
-                                <p:cTn id="9" presetID="1" presetClass="entr" presetSubtype="0" fill="hold" nodeType="clickEffect">
-                                  <p:stCondLst>
-                                    <p:cond delay="0"/>
-                                  </p:stCondLst>
-                                  <p:childTnLst>
-                                    <p:set>
-                                      <p:cBhvr>
-                                        <p:cTn id="10" dur="1" fill="hold">
-                                          <p:stCondLst>
-                                            <p:cond delay="0"/>
-                                          </p:stCondLst>
-                                        </p:cTn>
-                                        <p:tgtEl>
                                           <p:spTgt spid="9">
                                             <p:txEl>
                                               <p:pRg st="2" end="2"/>
@@ -21325,14 +21267,14 @@
                                 </p:cTn>
                               </p:par>
                               <p:par>
-                                <p:cTn id="11" presetID="1" presetClass="entr" presetSubtype="0" fill="hold" nodeType="withEffect">
+                                <p:cTn id="7" presetID="1" presetClass="entr" presetSubtype="0" fill="hold" nodeType="withEffect">
                                   <p:stCondLst>
                                     <p:cond delay="0"/>
                                   </p:stCondLst>
                                   <p:childTnLst>
                                     <p:set>
                                       <p:cBhvr>
-                                        <p:cTn id="12" dur="1" fill="hold">
+                                        <p:cTn id="8" dur="1" fill="hold">
                                           <p:stCondLst>
                                             <p:cond delay="0"/>
                                           </p:stCondLst>
@@ -21356,7 +21298,56 @@
                                 </p:cTn>
                               </p:par>
                               <p:par>
-                                <p:cTn id="13" presetID="1" presetClass="entr" presetSubtype="0" fill="hold" nodeType="withEffect">
+                                <p:cTn id="9" presetID="1" presetClass="entr" presetSubtype="0" fill="hold" nodeType="withEffect">
+                                  <p:stCondLst>
+                                    <p:cond delay="0"/>
+                                  </p:stCondLst>
+                                  <p:childTnLst>
+                                    <p:set>
+                                      <p:cBhvr>
+                                        <p:cTn id="10" dur="1" fill="hold">
+                                          <p:stCondLst>
+                                            <p:cond delay="0"/>
+                                          </p:stCondLst>
+                                        </p:cTn>
+                                        <p:tgtEl>
+                                          <p:spTgt spid="9">
+                                            <p:txEl>
+                                              <p:pRg st="4" end="4"/>
+                                            </p:txEl>
+                                          </p:spTgt>
+                                        </p:tgtEl>
+                                        <p:attrNameLst>
+                                          <p:attrName>style.visibility</p:attrName>
+                                        </p:attrNameLst>
+                                      </p:cBhvr>
+                                      <p:to>
+                                        <p:strVal val="visible"/>
+                                      </p:to>
+                                    </p:set>
+                                  </p:childTnLst>
+                                </p:cTn>
+                              </p:par>
+                            </p:childTnLst>
+                          </p:cTn>
+                        </p:par>
+                      </p:childTnLst>
+                    </p:cTn>
+                  </p:par>
+                  <p:par>
+                    <p:cTn id="11" fill="hold">
+                      <p:stCondLst>
+                        <p:cond delay="indefinite"/>
+                      </p:stCondLst>
+                      <p:childTnLst>
+                        <p:par>
+                          <p:cTn id="12" fill="hold">
+                            <p:stCondLst>
+                              <p:cond delay="0"/>
+                            </p:stCondLst>
+                            <p:childTnLst>
+                              <p:par>
+                                <p:cTn id="13" presetID="1" presetClass="entr" presetSubtype="0" fill="hold" nodeType="clickEffect">
                                   <p:stCondLst>
                                     <p:cond delay="0"/>
                                   </p:stCondLst>
@@ -21369,7 +21360,7 @@
                                           </p:stCondLst>
                                         </p:cTn>
                                         <p:tgtEl>
-                                          <p:spTgt spid="9">
+                                          <p:spTgt spid="6">
                                             <p:txEl>
                                               <p:pRg st="4" end="4"/>
                                             </p:txEl>
@@ -21400,55 +21391,8 @@
                                           </p:stCondLst>
                                         </p:cTn>
                                         <p:tgtEl>
-                                          <p:spTgt spid="10"/>
-                                        </p:tgtEl>
-                                        <p:attrNameLst>
-                                          <p:attrName>style.visibility</p:attrName>
-                                        </p:attrNameLst>
-                                      </p:cBhvr>
-                                      <p:to>
-                                        <p:strVal val="visible"/>
-                                      </p:to>
-                                    </p:set>
-                                  </p:childTnLst>
-                                </p:cTn>
-                              </p:par>
-                            </p:childTnLst>
-                          </p:cTn>
-                        </p:par>
-                      </p:childTnLst>
-                    </p:cTn>
-                  </p:par>
-                  <p:par>
-                    <p:cTn id="17" fill="hold">
-                      <p:stCondLst>
-                        <p:cond delay="indefinite"/>
-                      </p:stCondLst>
-                      <p:childTnLst>
-                        <p:par>
-                          <p:cTn id="18" fill="hold">
-                            <p:stCondLst>
-                              <p:cond delay="0"/>
-                            </p:stCondLst>
-                            <p:childTnLst>
-                              <p:par>
-                                <p:cTn id="19" presetID="1" presetClass="entr" presetSubtype="0" fill="hold" nodeType="clickEffect">
-                                  <p:stCondLst>
-                                    <p:cond delay="0"/>
-                                  </p:stCondLst>
-                                  <p:childTnLst>
-                                    <p:set>
-                                      <p:cBhvr>
-                                        <p:cTn id="20" dur="1" fill="hold">
-                                          <p:stCondLst>
-                                            <p:cond delay="0"/>
-                                          </p:stCondLst>
-                                        </p:cTn>
-                                        <p:tgtEl>
-                                          <p:spTgt spid="6">
-                                            <p:txEl>
-                                              <p:pRg st="4" end="4"/>
-                                            </p:txEl>
+                                          <p:spTgt spid="10">
+                                            <p:bg/>
                                           </p:spTgt>
                                         </p:tgtEl>
                                         <p:attrNameLst>
@@ -21463,14 +21407,14 @@
                                 </p:cTn>
                               </p:par>
                               <p:par>
-                                <p:cTn id="21" presetID="1" presetClass="entr" presetSubtype="0" fill="hold" nodeType="withEffect">
+                                <p:cTn id="17" presetID="1" presetClass="entr" presetSubtype="0" fill="hold" nodeType="withEffect">
                                   <p:stCondLst>
                                     <p:cond delay="0"/>
                                   </p:stCondLst>
                                   <p:childTnLst>
                                     <p:set>
                                       <p:cBhvr>
-                                        <p:cTn id="22" dur="1" fill="hold">
+                                        <p:cTn id="18" dur="1" fill="hold">
                                           <p:stCondLst>
                                             <p:cond delay="0"/>
                                           </p:stCondLst>
@@ -21500,26 +21444,26 @@
                     </p:cTn>
                   </p:par>
                   <p:par>
-                    <p:cTn id="23" fill="hold">
+                    <p:cTn id="19" fill="hold">
                       <p:stCondLst>
                         <p:cond delay="indefinite"/>
                       </p:stCondLst>
                       <p:childTnLst>
                         <p:par>
-                          <p:cTn id="24" fill="hold">
+                          <p:cTn id="20" fill="hold">
                             <p:stCondLst>
                               <p:cond delay="0"/>
                             </p:stCondLst>
                             <p:childTnLst>
                               <p:par>
-                                <p:cTn id="25" presetID="1" presetClass="entr" presetSubtype="0" fill="hold" nodeType="clickEffect">
+                                <p:cTn id="21" presetID="1" presetClass="entr" presetSubtype="0" fill="hold" nodeType="clickEffect">
                                   <p:stCondLst>
                                     <p:cond delay="0"/>
                                   </p:stCondLst>
                                   <p:childTnLst>
                                     <p:set>
                                       <p:cBhvr>
-                                        <p:cTn id="26" dur="1" fill="hold">
+                                        <p:cTn id="22" dur="1" fill="hold">
                                           <p:stCondLst>
                                             <p:cond delay="0"/>
                                           </p:stCondLst>
@@ -21543,14 +21487,14 @@
                                 </p:cTn>
                               </p:par>
                               <p:par>
-                                <p:cTn id="27" presetID="1" presetClass="entr" presetSubtype="0" fill="hold" nodeType="withEffect">
+                                <p:cTn id="23" presetID="1" presetClass="entr" presetSubtype="0" fill="hold" nodeType="withEffect">
                                   <p:stCondLst>
                                     <p:cond delay="0"/>
                                   </p:stCondLst>
                                   <p:childTnLst>
                                     <p:set>
                                       <p:cBhvr>
-                                        <p:cTn id="28" dur="1" fill="hold">
+                                        <p:cTn id="24" dur="1" fill="hold">
                                           <p:stCondLst>
                                             <p:cond delay="0"/>
                                           </p:stCondLst>
@@ -21574,14 +21518,14 @@
                                 </p:cTn>
                               </p:par>
                               <p:par>
-                                <p:cTn id="29" presetID="1" presetClass="entr" presetSubtype="0" fill="hold" nodeType="withEffect">
+                                <p:cTn id="25" presetID="1" presetClass="entr" presetSubtype="0" fill="hold" nodeType="withEffect">
                                   <p:stCondLst>
                                     <p:cond delay="0"/>
                                   </p:stCondLst>
                                   <p:childTnLst>
                                     <p:set>
                                       <p:cBhvr>
-                                        <p:cTn id="30" dur="1" fill="hold">
+                                        <p:cTn id="26" dur="1" fill="hold">
                                           <p:stCondLst>
                                             <p:cond delay="0"/>
                                           </p:stCondLst>
@@ -21611,26 +21555,26 @@
                     </p:cTn>
                   </p:par>
                   <p:par>
-                    <p:cTn id="31" fill="hold">
+                    <p:cTn id="27" fill="hold">
                       <p:stCondLst>
                         <p:cond delay="indefinite"/>
                       </p:stCondLst>
                       <p:childTnLst>
                         <p:par>
-                          <p:cTn id="32" fill="hold">
+                          <p:cTn id="28" fill="hold">
                             <p:stCondLst>
                               <p:cond delay="0"/>
                             </p:stCondLst>
                             <p:childTnLst>
                               <p:par>
-                                <p:cTn id="33" presetID="1" presetClass="entr" presetSubtype="0" fill="hold" nodeType="clickEffect">
+                                <p:cTn id="29" presetID="1" presetClass="entr" presetSubtype="0" fill="hold" nodeType="clickEffect">
                                   <p:stCondLst>
                                     <p:cond delay="0"/>
                                   </p:stCondLst>
                                   <p:childTnLst>
                                     <p:set>
                                       <p:cBhvr>
-                                        <p:cTn id="34" dur="1" fill="hold">
+                                        <p:cTn id="30" dur="1" fill="hold">
                                           <p:stCondLst>
                                             <p:cond delay="0"/>
                                           </p:stCondLst>
@@ -21681,7 +21625,7 @@
       </p:par>
     </p:tnLst>
     <p:bldLst>
-      <p:bldP spid="10" grpId="0" animBg="1"/>
+      <p:bldP spid="10" grpId="0" uiExpand="1" build="allAtOnce" animBg="1"/>
     </p:bldLst>
   </p:timing>
 </p:sld>
@@ -21722,8 +21666,8 @@
         </p:nvSpPr>
         <p:spPr>
           <a:xfrm>
-            <a:off x="190402" y="1196125"/>
-            <a:ext cx="12239201" cy="5528766"/>
+            <a:off x="190403" y="1196125"/>
+            <a:ext cx="11930042" cy="5528766"/>
           </a:xfrm>
         </p:spPr>
         <p:txBody>
@@ -21742,7 +21686,15 @@
             </a:pPr>
             <a:r>
               <a:rPr lang="en-GB" sz="3400" dirty="0"/>
-              <a:t>На първия ред получавате броя на редиците: </a:t>
+              <a:t>На първия ред получавате броя на </a:t>
+            </a:r>
+            <a:r>
+              <a:rPr lang="bg-BG" sz="3400" dirty="0"/>
+              <a:t>редовете</a:t>
+            </a:r>
+            <a:r>
+              <a:rPr lang="en-GB" sz="3400" dirty="0"/>
+              <a:t>: </a:t>
             </a:r>
             <a:r>
               <a:rPr lang="en-GB" sz="3400" b="1" dirty="0"/>
@@ -21776,7 +21728,19 @@
             </a:br>
             <a:r>
               <a:rPr lang="en-GB" sz="3400" dirty="0"/>
-              <a:t>за всяка редица</a:t>
+              <a:t>за </a:t>
+            </a:r>
+            <a:r>
+              <a:rPr lang="bg-BG" sz="3400" dirty="0"/>
+              <a:t>всеки</a:t>
+            </a:r>
+            <a:r>
+              <a:rPr lang="en-GB" sz="3400" dirty="0"/>
+              <a:t> </a:t>
+            </a:r>
+            <a:r>
+              <a:rPr lang="bg-BG" sz="3400" dirty="0"/>
+              <a:t>ред</a:t>
             </a:r>
             <a:endParaRPr lang="en-GB" sz="3400" dirty="0">
               <a:cs typeface="Calibri"/>
@@ -21793,7 +21757,7 @@
             </a:pPr>
             <a:r>
               <a:rPr lang="en-GB" sz="3400" dirty="0"/>
-              <a:t>Докато не получите "</a:t>
+              <a:t>Докато получите "</a:t>
             </a:r>
             <a:r>
               <a:rPr lang="en-GB" sz="3400" b="1" dirty="0">
@@ -21807,6 +21771,10 @@
             <a:r>
               <a:rPr lang="en-GB" sz="3400" dirty="0"/>
               <a:t>", четете командите</a:t>
+            </a:r>
+            <a:r>
+              <a:rPr lang="bg-BG" sz="3400" dirty="0"/>
+              <a:t>:</a:t>
             </a:r>
             <a:endParaRPr lang="en-GB" sz="3400" dirty="0">
               <a:cs typeface="Calibri"/>
@@ -21860,7 +21828,25 @@
                 </a:solidFill>
                 <a:latin typeface="Consolas"/>
               </a:rPr>
-              <a:t>} {</a:t>
+              <a:t>}</a:t>
+            </a:r>
+            <a:r>
+              <a:rPr lang="bg-BG" sz="3200" dirty="0">
+                <a:solidFill>
+                  <a:schemeClr val="bg1"/>
+                </a:solidFill>
+                <a:latin typeface="Consolas"/>
+              </a:rPr>
+              <a:t> </a:t>
+            </a:r>
+            <a:r>
+              <a:rPr lang="en-GB" sz="3200" dirty="0">
+                <a:solidFill>
+                  <a:schemeClr val="bg1"/>
+                </a:solidFill>
+                <a:latin typeface="Consolas"/>
+              </a:rPr>
+              <a:t>{</a:t>
             </a:r>
             <a:r>
               <a:rPr lang="en-GB" sz="3200" b="1" dirty="0">
@@ -22007,7 +21993,15 @@
                   <a:srgbClr val="234465"/>
                 </a:solidFill>
               </a:rPr>
-              <a:t>рдинатите са невалидни</a:t>
+              <a:t>рдинатите са </a:t>
+            </a:r>
+            <a:r>
+              <a:rPr lang="en-GB" sz="3400" b="1" dirty="0">
+                <a:solidFill>
+                  <a:srgbClr val="234465"/>
+                </a:solidFill>
+              </a:rPr>
+              <a:t>невалидни</a:t>
             </a:r>
             <a:r>
               <a:rPr lang="bg-BG" sz="3400" dirty="0">
@@ -22092,12 +22086,8 @@
               <a:t>END</a:t>
             </a:r>
             <a:r>
-              <a:rPr lang="en-GB" sz="3400" dirty="0"/>
-              <a:t>“</a:t>
-            </a:r>
-            <a:r>
               <a:rPr lang="bg-BG" sz="3400" dirty="0"/>
-              <a:t>,</a:t>
+              <a:t>",</a:t>
             </a:r>
             <a:r>
               <a:rPr lang="en-GB" sz="3400" dirty="0"/>
@@ -22154,7 +22144,7 @@
         </p:nvSpPr>
         <p:spPr bwMode="auto">
           <a:xfrm>
-            <a:off x="9399249" y="1522454"/>
+            <a:off x="9156000" y="2619000"/>
             <a:ext cx="2718158" cy="2676758"/>
           </a:xfrm>
           <a:prstGeom prst="rect">
@@ -22342,7 +22332,7 @@
                                         <p:tgtEl>
                                           <p:spTgt spid="7">
                                             <p:txEl>
-                                              <p:pRg st="0" end="0"/>
+                                              <p:pRg st="1" end="1"/>
                                             </p:txEl>
                                           </p:spTgt>
                                         </p:tgtEl>
@@ -22391,55 +22381,6 @@
                                         <p:tgtEl>
                                           <p:spTgt spid="7">
                                             <p:txEl>
-                                              <p:pRg st="1" end="1"/>
-                                            </p:txEl>
-                                          </p:spTgt>
-                                        </p:tgtEl>
-                                        <p:attrNameLst>
-                                          <p:attrName>style.visibility</p:attrName>
-                                        </p:attrNameLst>
-                                      </p:cBhvr>
-                                      <p:to>
-                                        <p:strVal val="visible"/>
-                                      </p:to>
-                                    </p:set>
-                                  </p:childTnLst>
-                                </p:cTn>
-                              </p:par>
-                            </p:childTnLst>
-                          </p:cTn>
-                        </p:par>
-                      </p:childTnLst>
-                    </p:cTn>
-                  </p:par>
-                  <p:par>
-                    <p:cTn id="11" fill="hold">
-                      <p:stCondLst>
-                        <p:cond delay="indefinite"/>
-                      </p:stCondLst>
-                      <p:childTnLst>
-                        <p:par>
-                          <p:cTn id="12" fill="hold">
-                            <p:stCondLst>
-                              <p:cond delay="0"/>
-                            </p:stCondLst>
-                            <p:childTnLst>
-                              <p:par>
-                                <p:cTn id="13" presetID="1" presetClass="entr" presetSubtype="0" fill="hold" nodeType="clickEffect">
-                                  <p:stCondLst>
-                                    <p:cond delay="0"/>
-                                  </p:stCondLst>
-                                  <p:childTnLst>
-                                    <p:set>
-                                      <p:cBhvr>
-                                        <p:cTn id="14" dur="1" fill="hold">
-                                          <p:stCondLst>
-                                            <p:cond delay="0"/>
-                                          </p:stCondLst>
-                                        </p:cTn>
-                                        <p:tgtEl>
-                                          <p:spTgt spid="7">
-                                            <p:txEl>
                                               <p:pRg st="2" end="2"/>
                                             </p:txEl>
                                           </p:spTgt>
@@ -22455,33 +22396,15 @@
                                   </p:childTnLst>
                                 </p:cTn>
                               </p:par>
-                            </p:childTnLst>
-                          </p:cTn>
-                        </p:par>
-                      </p:childTnLst>
-                    </p:cTn>
-                  </p:par>
-                  <p:par>
-                    <p:cTn id="15" fill="hold">
-                      <p:stCondLst>
-                        <p:cond delay="indefinite"/>
-                      </p:stCondLst>
-                      <p:childTnLst>
-                        <p:par>
-                          <p:cTn id="16" fill="hold">
-                            <p:stCondLst>
-                              <p:cond delay="0"/>
-                            </p:stCondLst>
-                            <p:childTnLst>
                               <p:par>
-                                <p:cTn id="17" presetID="1" presetClass="entr" presetSubtype="0" fill="hold" nodeType="clickEffect">
+                                <p:cTn id="11" presetID="1" presetClass="entr" presetSubtype="0" fill="hold" nodeType="withEffect">
                                   <p:stCondLst>
                                     <p:cond delay="0"/>
                                   </p:stCondLst>
                                   <p:childTnLst>
                                     <p:set>
                                       <p:cBhvr>
-                                        <p:cTn id="18" dur="1" fill="hold">
+                                        <p:cTn id="12" dur="1" fill="hold">
                                           <p:stCondLst>
                                             <p:cond delay="0"/>
                                           </p:stCondLst>
@@ -22511,26 +22434,26 @@
                     </p:cTn>
                   </p:par>
                   <p:par>
-                    <p:cTn id="19" fill="hold">
+                    <p:cTn id="13" fill="hold">
                       <p:stCondLst>
                         <p:cond delay="indefinite"/>
                       </p:stCondLst>
                       <p:childTnLst>
                         <p:par>
-                          <p:cTn id="20" fill="hold">
+                          <p:cTn id="14" fill="hold">
                             <p:stCondLst>
                               <p:cond delay="0"/>
                             </p:stCondLst>
                             <p:childTnLst>
                               <p:par>
-                                <p:cTn id="21" presetID="1" presetClass="entr" presetSubtype="0" fill="hold" nodeType="clickEffect">
+                                <p:cTn id="15" presetID="1" presetClass="entr" presetSubtype="0" fill="hold" nodeType="clickEffect">
                                   <p:stCondLst>
                                     <p:cond delay="0"/>
                                   </p:stCondLst>
                                   <p:childTnLst>
                                     <p:set>
                                       <p:cBhvr>
-                                        <p:cTn id="22" dur="1" fill="hold">
+                                        <p:cTn id="16" dur="1" fill="hold">
                                           <p:stCondLst>
                                             <p:cond delay="0"/>
                                           </p:stCondLst>
@@ -22560,26 +22483,26 @@
                     </p:cTn>
                   </p:par>
                   <p:par>
-                    <p:cTn id="23" fill="hold">
+                    <p:cTn id="17" fill="hold">
                       <p:stCondLst>
                         <p:cond delay="indefinite"/>
                       </p:stCondLst>
                       <p:childTnLst>
                         <p:par>
-                          <p:cTn id="24" fill="hold">
+                          <p:cTn id="18" fill="hold">
                             <p:stCondLst>
                               <p:cond delay="0"/>
                             </p:stCondLst>
                             <p:childTnLst>
                               <p:par>
-                                <p:cTn id="25" presetID="1" presetClass="entr" presetSubtype="0" fill="hold" nodeType="clickEffect">
+                                <p:cTn id="19" presetID="1" presetClass="entr" presetSubtype="0" fill="hold" nodeType="clickEffect">
                                   <p:stCondLst>
                                     <p:cond delay="0"/>
                                   </p:stCondLst>
                                   <p:childTnLst>
                                     <p:set>
                                       <p:cBhvr>
-                                        <p:cTn id="26" dur="1" fill="hold">
+                                        <p:cTn id="20" dur="1" fill="hold">
                                           <p:stCondLst>
                                             <p:cond delay="0"/>
                                           </p:stCondLst>
@@ -22609,26 +22532,26 @@
                     </p:cTn>
                   </p:par>
                   <p:par>
-                    <p:cTn id="27" fill="hold">
+                    <p:cTn id="21" fill="hold">
                       <p:stCondLst>
                         <p:cond delay="indefinite"/>
                       </p:stCondLst>
                       <p:childTnLst>
                         <p:par>
-                          <p:cTn id="28" fill="hold">
+                          <p:cTn id="22" fill="hold">
                             <p:stCondLst>
                               <p:cond delay="0"/>
                             </p:stCondLst>
                             <p:childTnLst>
                               <p:par>
-                                <p:cTn id="29" presetID="1" presetClass="entr" presetSubtype="0" fill="hold" nodeType="clickEffect">
+                                <p:cTn id="23" presetID="1" presetClass="entr" presetSubtype="0" fill="hold" nodeType="clickEffect">
                                   <p:stCondLst>
                                     <p:cond delay="0"/>
                                   </p:stCondLst>
                                   <p:childTnLst>
                                     <p:set>
                                       <p:cBhvr>
-                                        <p:cTn id="30" dur="1" fill="hold">
+                                        <p:cTn id="24" dur="1" fill="hold">
                                           <p:stCondLst>
                                             <p:cond delay="0"/>
                                           </p:stCondLst>
@@ -24558,15 +24481,35 @@
             <a:pPr marL="360045" indent="-360045"/>
             <a:r>
               <a:rPr lang="en-GB" sz="3350" dirty="0"/>
-              <a:t>Напишете програма, която принтира </a:t>
+              <a:t>Напишете програма, която </a:t>
+            </a:r>
+            <a:r>
+              <a:rPr lang="bg-BG" sz="3350" dirty="0"/>
+              <a:t>отпечатва</a:t>
+            </a:r>
+            <a:r>
+              <a:rPr lang="en-GB" sz="3350" dirty="0"/>
+              <a:t> </a:t>
             </a:r>
             <a:r>
               <a:rPr lang="en-GB" sz="3350" b="1" dirty="0">
-                <a:hlinkClick r:id="rId2"/>
+                <a:solidFill>
+                  <a:schemeClr val="bg1"/>
+                </a:solidFill>
+                <a:hlinkClick r:id="rId2">
+                  <a:extLst>
+                    <a:ext uri="{A12FA001-AC4F-418D-AE19-62706E023703}">
+                      <ahyp:hlinkClr xmlns:ahyp="http://schemas.microsoft.com/office/drawing/2018/hyperlinkcolor" val="tx"/>
+                    </a:ext>
+                  </a:extLst>
+                </a:hlinkClick>
               </a:rPr>
               <a:t>триъгълника на Паскал</a:t>
             </a:r>
             <a:endParaRPr lang="en-GB" sz="3350" b="1" dirty="0">
+              <a:solidFill>
+                <a:schemeClr val="bg1"/>
+              </a:solidFill>
               <a:cs typeface="Calibri"/>
             </a:endParaRPr>
           </a:p>
@@ -25321,7 +25264,7 @@
                             </p:stCondLst>
                             <p:childTnLst>
                               <p:par>
-                                <p:cTn id="5" presetID="1" presetClass="entr" presetSubtype="0" fill="hold" nodeType="clickEffect">
+                                <p:cTn id="5" presetID="1" presetClass="entr" presetSubtype="0" fill="hold" grpId="0" nodeType="clickEffect">
                                   <p:stCondLst>
                                     <p:cond delay="0"/>
                                   </p:stCondLst>
@@ -25329,55 +25272,6 @@
                                     <p:set>
                                       <p:cBhvr>
                                         <p:cTn id="6" dur="1" fill="hold">
-                                          <p:stCondLst>
-                                            <p:cond delay="0"/>
-                                          </p:stCondLst>
-                                        </p:cTn>
-                                        <p:tgtEl>
-                                          <p:spTgt spid="7">
-                                            <p:txEl>
-                                              <p:pRg st="0" end="0"/>
-                                            </p:txEl>
-                                          </p:spTgt>
-                                        </p:tgtEl>
-                                        <p:attrNameLst>
-                                          <p:attrName>style.visibility</p:attrName>
-                                        </p:attrNameLst>
-                                      </p:cBhvr>
-                                      <p:to>
-                                        <p:strVal val="visible"/>
-                                      </p:to>
-                                    </p:set>
-                                  </p:childTnLst>
-                                </p:cTn>
-                              </p:par>
-                            </p:childTnLst>
-                          </p:cTn>
-                        </p:par>
-                      </p:childTnLst>
-                    </p:cTn>
-                  </p:par>
-                  <p:par>
-                    <p:cTn id="7" fill="hold">
-                      <p:stCondLst>
-                        <p:cond delay="indefinite"/>
-                      </p:stCondLst>
-                      <p:childTnLst>
-                        <p:par>
-                          <p:cTn id="8" fill="hold">
-                            <p:stCondLst>
-                              <p:cond delay="0"/>
-                            </p:stCondLst>
-                            <p:childTnLst>
-                              <p:par>
-                                <p:cTn id="9" presetID="1" presetClass="entr" presetSubtype="0" fill="hold" grpId="0" nodeType="clickEffect">
-                                  <p:stCondLst>
-                                    <p:cond delay="0"/>
-                                  </p:stCondLst>
-                                  <p:childTnLst>
-                                    <p:set>
-                                      <p:cBhvr>
-                                        <p:cTn id="10" dur="1" fill="hold">
                                           <p:stCondLst>
                                             <p:cond delay="0"/>
                                           </p:stCondLst>
@@ -25397,14 +25291,14 @@
                                 </p:cTn>
                               </p:par>
                               <p:par>
-                                <p:cTn id="11" presetID="1" presetClass="entr" presetSubtype="0" fill="hold" grpId="0" nodeType="withEffect">
+                                <p:cTn id="7" presetID="1" presetClass="entr" presetSubtype="0" fill="hold" grpId="0" nodeType="withEffect">
                                   <p:stCondLst>
                                     <p:cond delay="0"/>
                                   </p:stCondLst>
                                   <p:childTnLst>
                                     <p:set>
                                       <p:cBhvr>
-                                        <p:cTn id="12" dur="1" fill="hold">
+                                        <p:cTn id="8" dur="1" fill="hold">
                                           <p:stCondLst>
                                             <p:cond delay="0"/>
                                           </p:stCondLst>
@@ -25424,14 +25318,14 @@
                                 </p:cTn>
                               </p:par>
                               <p:par>
-                                <p:cTn id="13" presetID="1" presetClass="entr" presetSubtype="0" fill="hold" grpId="0" nodeType="withEffect">
+                                <p:cTn id="9" presetID="1" presetClass="entr" presetSubtype="0" fill="hold" grpId="0" nodeType="withEffect">
                                   <p:stCondLst>
                                     <p:cond delay="0"/>
                                   </p:stCondLst>
                                   <p:childTnLst>
                                     <p:set>
                                       <p:cBhvr>
-                                        <p:cTn id="14" dur="1" fill="hold">
+                                        <p:cTn id="10" dur="1" fill="hold">
                                           <p:stCondLst>
                                             <p:cond delay="0"/>
                                           </p:stCondLst>
@@ -25457,26 +25351,26 @@
                     </p:cTn>
                   </p:par>
                   <p:par>
-                    <p:cTn id="15" fill="hold">
+                    <p:cTn id="11" fill="hold">
                       <p:stCondLst>
                         <p:cond delay="indefinite"/>
                       </p:stCondLst>
                       <p:childTnLst>
                         <p:par>
-                          <p:cTn id="16" fill="hold">
+                          <p:cTn id="12" fill="hold">
                             <p:stCondLst>
                               <p:cond delay="0"/>
                             </p:stCondLst>
                             <p:childTnLst>
                               <p:par>
-                                <p:cTn id="17" presetID="1" presetClass="entr" presetSubtype="0" fill="hold" grpId="0" nodeType="clickEffect">
+                                <p:cTn id="13" presetID="1" presetClass="entr" presetSubtype="0" fill="hold" grpId="0" nodeType="clickEffect">
                                   <p:stCondLst>
                                     <p:cond delay="0"/>
                                   </p:stCondLst>
                                   <p:childTnLst>
                                     <p:set>
                                       <p:cBhvr>
-                                        <p:cTn id="18" dur="1" fill="hold">
+                                        <p:cTn id="14" dur="1" fill="hold">
                                           <p:stCondLst>
                                             <p:cond delay="0"/>
                                           </p:stCondLst>
@@ -25496,14 +25390,14 @@
                                 </p:cTn>
                               </p:par>
                               <p:par>
-                                <p:cTn id="19" presetID="1" presetClass="entr" presetSubtype="0" fill="hold" grpId="0" nodeType="withEffect">
+                                <p:cTn id="15" presetID="1" presetClass="entr" presetSubtype="0" fill="hold" grpId="0" nodeType="withEffect">
                                   <p:stCondLst>
                                     <p:cond delay="0"/>
                                   </p:stCondLst>
                                   <p:childTnLst>
                                     <p:set>
                                       <p:cBhvr>
-                                        <p:cTn id="20" dur="1" fill="hold">
+                                        <p:cTn id="16" dur="1" fill="hold">
                                           <p:stCondLst>
                                             <p:cond delay="0"/>
                                           </p:stCondLst>
@@ -25523,14 +25417,14 @@
                                 </p:cTn>
                               </p:par>
                               <p:par>
-                                <p:cTn id="21" presetID="1" presetClass="entr" presetSubtype="0" fill="hold" grpId="0" nodeType="withEffect">
+                                <p:cTn id="17" presetID="1" presetClass="entr" presetSubtype="0" fill="hold" grpId="0" nodeType="withEffect">
                                   <p:stCondLst>
                                     <p:cond delay="0"/>
                                   </p:stCondLst>
                                   <p:childTnLst>
                                     <p:set>
                                       <p:cBhvr>
-                                        <p:cTn id="22" dur="1" fill="hold">
+                                        <p:cTn id="18" dur="1" fill="hold">
                                           <p:stCondLst>
                                             <p:cond delay="0"/>
                                           </p:stCondLst>
@@ -25556,26 +25450,26 @@
                     </p:cTn>
                   </p:par>
                   <p:par>
-                    <p:cTn id="23" fill="hold">
+                    <p:cTn id="19" fill="hold">
                       <p:stCondLst>
                         <p:cond delay="indefinite"/>
                       </p:stCondLst>
                       <p:childTnLst>
                         <p:par>
-                          <p:cTn id="24" fill="hold">
+                          <p:cTn id="20" fill="hold">
                             <p:stCondLst>
                               <p:cond delay="0"/>
                             </p:stCondLst>
                             <p:childTnLst>
                               <p:par>
-                                <p:cTn id="25" presetID="1" presetClass="entr" presetSubtype="0" fill="hold" grpId="0" nodeType="clickEffect">
+                                <p:cTn id="21" presetID="1" presetClass="entr" presetSubtype="0" fill="hold" grpId="0" nodeType="clickEffect">
                                   <p:stCondLst>
                                     <p:cond delay="0"/>
                                   </p:stCondLst>
                                   <p:childTnLst>
                                     <p:set>
                                       <p:cBhvr>
-                                        <p:cTn id="26" dur="1" fill="hold">
+                                        <p:cTn id="22" dur="1" fill="hold">
                                           <p:stCondLst>
                                             <p:cond delay="0"/>
                                           </p:stCondLst>
@@ -25595,14 +25489,14 @@
                                 </p:cTn>
                               </p:par>
                               <p:par>
-                                <p:cTn id="27" presetID="1" presetClass="entr" presetSubtype="0" fill="hold" grpId="0" nodeType="withEffect">
+                                <p:cTn id="23" presetID="1" presetClass="entr" presetSubtype="0" fill="hold" grpId="0" nodeType="withEffect">
                                   <p:stCondLst>
                                     <p:cond delay="0"/>
                                   </p:stCondLst>
                                   <p:childTnLst>
                                     <p:set>
                                       <p:cBhvr>
-                                        <p:cTn id="28" dur="1" fill="hold">
+                                        <p:cTn id="24" dur="1" fill="hold">
                                           <p:stCondLst>
                                             <p:cond delay="0"/>
                                           </p:stCondLst>
@@ -25622,14 +25516,14 @@
                                 </p:cTn>
                               </p:par>
                               <p:par>
-                                <p:cTn id="29" presetID="1" presetClass="entr" presetSubtype="0" fill="hold" grpId="0" nodeType="withEffect">
+                                <p:cTn id="25" presetID="1" presetClass="entr" presetSubtype="0" fill="hold" grpId="0" nodeType="withEffect">
                                   <p:stCondLst>
                                     <p:cond delay="0"/>
                                   </p:stCondLst>
                                   <p:childTnLst>
                                     <p:set>
                                       <p:cBhvr>
-                                        <p:cTn id="30" dur="1" fill="hold">
+                                        <p:cTn id="26" dur="1" fill="hold">
                                           <p:stCondLst>
                                             <p:cond delay="0"/>
                                           </p:stCondLst>
@@ -25718,7 +25612,7 @@
         <p:spPr bwMode="auto">
           <a:xfrm>
             <a:off x="744500" y="1160295"/>
-            <a:ext cx="11008529" cy="5693866"/>
+            <a:ext cx="11008529" cy="5262979"/>
           </a:xfrm>
           <a:prstGeom prst="rect">
             <a:avLst/>
@@ -26094,7 +25988,67 @@
                 <a:latin typeface="Consolas"/>
                 <a:cs typeface="Consolas" pitchFamily="49" charset="0"/>
               </a:rPr>
-              <a:t> Да се запълнят елементите на всяка редица </a:t>
+              <a:t> </a:t>
+            </a:r>
+            <a:r>
+              <a:rPr lang="bg-BG" sz="2800" b="1" i="1" noProof="1">
+                <a:solidFill>
+                  <a:schemeClr val="accent2"/>
+                </a:solidFill>
+                <a:latin typeface="Consolas"/>
+                <a:cs typeface="Consolas" pitchFamily="49" charset="0"/>
+              </a:rPr>
+              <a:t>Запълнете </a:t>
+            </a:r>
+            <a:r>
+              <a:rPr lang="en-US" sz="2800" b="1" i="1" noProof="1">
+                <a:solidFill>
+                  <a:schemeClr val="accent2"/>
+                </a:solidFill>
+                <a:latin typeface="Consolas"/>
+                <a:cs typeface="Consolas" pitchFamily="49" charset="0"/>
+              </a:rPr>
+              <a:t>елементите на </a:t>
+            </a:r>
+            <a:r>
+              <a:rPr lang="bg-BG" sz="2800" b="1" i="1" noProof="1">
+                <a:solidFill>
+                  <a:schemeClr val="accent2"/>
+                </a:solidFill>
+                <a:latin typeface="Consolas"/>
+                <a:cs typeface="Consolas" pitchFamily="49" charset="0"/>
+              </a:rPr>
+              <a:t>всеки</a:t>
+            </a:r>
+            <a:r>
+              <a:rPr lang="en-US" sz="2800" b="1" i="1" noProof="1">
+                <a:solidFill>
+                  <a:schemeClr val="accent2"/>
+                </a:solidFill>
+                <a:latin typeface="Consolas"/>
+                <a:cs typeface="Consolas" pitchFamily="49" charset="0"/>
+              </a:rPr>
+              <a:t> </a:t>
+            </a:r>
+            <a:r>
+              <a:rPr lang="bg-BG" sz="2800" b="1" i="1" noProof="1">
+                <a:solidFill>
+                  <a:schemeClr val="accent2"/>
+                </a:solidFill>
+                <a:latin typeface="Consolas"/>
+                <a:cs typeface="Consolas" pitchFamily="49" charset="0"/>
+              </a:rPr>
+              <a:t>ред</a:t>
+            </a:r>
+            <a:r>
+              <a:rPr lang="en-US" sz="2800" b="1" i="1" noProof="1">
+                <a:solidFill>
+                  <a:schemeClr val="accent2"/>
+                </a:solidFill>
+                <a:latin typeface="Consolas"/>
+                <a:cs typeface="Consolas" pitchFamily="49" charset="0"/>
+              </a:rPr>
+              <a:t> </a:t>
             </a:r>
             <a:br>
               <a:rPr lang="en-US" sz="2800" b="1" i="1" noProof="1">
@@ -26105,27 +26059,6 @@
                 <a:cs typeface="Consolas" pitchFamily="49" charset="0"/>
               </a:rPr>
             </a:br>
-            <a:r>
-              <a:rPr lang="en-US" sz="2800" b="1" i="1" noProof="1">
-                <a:solidFill>
-                  <a:schemeClr val="accent2"/>
-                </a:solidFill>
-                <a:latin typeface="Consolas"/>
-                <a:cs typeface="Consolas" pitchFamily="49" charset="0"/>
-              </a:rPr>
-              <a:t>    (следващият слайд)</a:t>
-            </a:r>
-          </a:p>
-          <a:p>
-            <a:pPr eaLnBrk="0" hangingPunct="0">
-              <a:buClr>
-                <a:schemeClr val="accent5">
-                  <a:lumMod val="40000"/>
-                  <a:lumOff val="60000"/>
-                </a:schemeClr>
-              </a:buClr>
-              <a:buSzPct val="70000"/>
-            </a:pPr>
             <a:r>
               <a:rPr lang="en-US" sz="2800" b="1" noProof="1">
                 <a:latin typeface="Consolas"/>
@@ -26404,15 +26337,33 @@
                                   </p:childTnLst>
                                 </p:cTn>
                               </p:par>
+                            </p:childTnLst>
+                          </p:cTn>
+                        </p:par>
+                      </p:childTnLst>
+                    </p:cTn>
+                  </p:par>
+                  <p:par>
+                    <p:cTn id="9" fill="hold">
+                      <p:stCondLst>
+                        <p:cond delay="indefinite"/>
+                      </p:stCondLst>
+                      <p:childTnLst>
+                        <p:par>
+                          <p:cTn id="10" fill="hold">
+                            <p:stCondLst>
+                              <p:cond delay="0"/>
+                            </p:stCondLst>
+                            <p:childTnLst>
                               <p:par>
-                                <p:cTn id="9" presetID="1" presetClass="entr" presetSubtype="0" fill="hold" nodeType="withEffect">
+                                <p:cTn id="11" presetID="1" presetClass="entr" presetSubtype="0" fill="hold" nodeType="clickEffect">
                                   <p:stCondLst>
                                     <p:cond delay="0"/>
                                   </p:stCondLst>
                                   <p:childTnLst>
                                     <p:set>
                                       <p:cBhvr>
-                                        <p:cTn id="10" dur="1" fill="hold">
+                                        <p:cTn id="12" dur="1" fill="hold">
                                           <p:stCondLst>
                                             <p:cond delay="0"/>
                                           </p:stCondLst>
@@ -26420,7 +26371,7 @@
                                         <p:tgtEl>
                                           <p:spTgt spid="6">
                                             <p:txEl>
-                                              <p:pRg st="11" end="11"/>
+                                              <p:pRg st="5" end="5"/>
                                             </p:txEl>
                                           </p:spTgt>
                                         </p:tgtEl>
@@ -26435,26 +26386,8 @@
                                   </p:childTnLst>
                                 </p:cTn>
                               </p:par>
-                            </p:childTnLst>
-                          </p:cTn>
-                        </p:par>
-                      </p:childTnLst>
-                    </p:cTn>
-                  </p:par>
-                  <p:par>
-                    <p:cTn id="11" fill="hold">
-                      <p:stCondLst>
-                        <p:cond delay="indefinite"/>
-                      </p:stCondLst>
-                      <p:childTnLst>
-                        <p:par>
-                          <p:cTn id="12" fill="hold">
-                            <p:stCondLst>
-                              <p:cond delay="0"/>
-                            </p:stCondLst>
-                            <p:childTnLst>
                               <p:par>
-                                <p:cTn id="13" presetID="1" presetClass="entr" presetSubtype="0" fill="hold" nodeType="clickEffect">
+                                <p:cTn id="13" presetID="1" presetClass="entr" presetSubtype="0" fill="hold" nodeType="withEffect">
                                   <p:stCondLst>
                                     <p:cond delay="0"/>
                                   </p:stCondLst>
@@ -26469,7 +26402,7 @@
                                         <p:tgtEl>
                                           <p:spTgt spid="6">
                                             <p:txEl>
-                                              <p:pRg st="5" end="5"/>
+                                              <p:pRg st="6" end="6"/>
                                             </p:txEl>
                                           </p:spTgt>
                                         </p:tgtEl>
@@ -26500,7 +26433,7 @@
                                         <p:tgtEl>
                                           <p:spTgt spid="6">
                                             <p:txEl>
-                                              <p:pRg st="6" end="6"/>
+                                              <p:pRg st="7" end="7"/>
                                             </p:txEl>
                                           </p:spTgt>
                                         </p:tgtEl>
@@ -26531,7 +26464,7 @@
                                         <p:tgtEl>
                                           <p:spTgt spid="6">
                                             <p:txEl>
-                                              <p:pRg st="7" end="7"/>
+                                              <p:pRg st="8" end="8"/>
                                             </p:txEl>
                                           </p:spTgt>
                                         </p:tgtEl>
@@ -26562,7 +26495,7 @@
                                         <p:tgtEl>
                                           <p:spTgt spid="6">
                                             <p:txEl>
-                                              <p:pRg st="8" end="8"/>
+                                              <p:pRg st="9" end="9"/>
                                             </p:txEl>
                                           </p:spTgt>
                                         </p:tgtEl>
@@ -26586,37 +26519,6 @@
                                     <p:set>
                                       <p:cBhvr>
                                         <p:cTn id="22" dur="1" fill="hold">
-                                          <p:stCondLst>
-                                            <p:cond delay="0"/>
-                                          </p:stCondLst>
-                                        </p:cTn>
-                                        <p:tgtEl>
-                                          <p:spTgt spid="6">
-                                            <p:txEl>
-                                              <p:pRg st="9" end="9"/>
-                                            </p:txEl>
-                                          </p:spTgt>
-                                        </p:tgtEl>
-                                        <p:attrNameLst>
-                                          <p:attrName>style.visibility</p:attrName>
-                                        </p:attrNameLst>
-                                      </p:cBhvr>
-                                      <p:to>
-                                        <p:strVal val="visible"/>
-                                      </p:to>
-                                    </p:set>
-                                  </p:childTnLst>
-                                </p:cTn>
-                              </p:par>
-                              <p:par>
-                                <p:cTn id="23" presetID="1" presetClass="entr" presetSubtype="0" fill="hold" nodeType="withEffect">
-                                  <p:stCondLst>
-                                    <p:cond delay="0"/>
-                                  </p:stCondLst>
-                                  <p:childTnLst>
-                                    <p:set>
-                                      <p:cBhvr>
-                                        <p:cTn id="24" dur="1" fill="hold">
                                           <p:stCondLst>
                                             <p:cond delay="0"/>
                                           </p:stCondLst>
@@ -27014,7 +26916,27 @@
                 <a:latin typeface="Consolas"/>
                 <a:cs typeface="Consolas" pitchFamily="49" charset="0"/>
               </a:rPr>
-              <a:t> Да се отпечата триъгълника</a:t>
+              <a:t> </a:t>
+            </a:r>
+            <a:r>
+              <a:rPr lang="bg-BG" sz="2500" b="1" i="1" noProof="1">
+                <a:solidFill>
+                  <a:schemeClr val="accent2"/>
+                </a:solidFill>
+                <a:latin typeface="Consolas"/>
+                <a:cs typeface="Consolas" pitchFamily="49" charset="0"/>
+              </a:rPr>
+              <a:t>Отпечатайте </a:t>
+            </a:r>
+            <a:r>
+              <a:rPr lang="en-US" sz="2500" b="1" i="1" noProof="1">
+                <a:solidFill>
+                  <a:schemeClr val="accent2"/>
+                </a:solidFill>
+                <a:latin typeface="Consolas"/>
+                <a:cs typeface="Consolas" pitchFamily="49" charset="0"/>
+              </a:rPr>
+              <a:t>триъгълника</a:t>
             </a:r>
             <a:endParaRPr lang="en-US" sz="2500" b="1" i="1" noProof="1">
               <a:solidFill>
@@ -27266,7 +27188,15 @@
             <a:pPr algn="ctr"/>
             <a:r>
               <a:rPr lang="en-US" sz="1950" dirty="0"/>
-              <a:t>Тествайте решението в Judge: </a:t>
+              <a:t>Тествайте решението</a:t>
+            </a:r>
+            <a:r>
+              <a:rPr lang="bg-BG" sz="1950" dirty="0"/>
+              <a:t> си</a:t>
+            </a:r>
+            <a:r>
+              <a:rPr lang="en-US" sz="1950" dirty="0"/>
+              <a:t> в Judge: </a:t>
             </a:r>
             <a:r>
               <a:rPr lang="en-US" sz="1950" dirty="0">
@@ -28239,7 +28169,7 @@
                   <a:schemeClr val="bg2"/>
                 </a:solidFill>
               </a:rPr>
-              <a:t>Имаме </a:t>
+              <a:t>Има </a:t>
             </a:r>
             <a:r>
               <a:rPr lang="en-US" sz="3350" b="1" dirty="0">
@@ -28281,10 +28211,10 @@
                   <a:schemeClr val="bg2"/>
                 </a:solidFill>
               </a:rPr>
-              <a:t>Масив от второ измерение е като таблица от  </a:t>
-            </a:r>
-            <a:r>
-              <a:rPr lang="en-US" sz="3350" b="1" dirty="0">
+              <a:t>Масив от второ измерение е като таблица от </a:t>
+            </a:r>
+            <a:r>
+              <a:rPr lang="en-US" sz="3350" b="1" dirty="0" err="1">
                 <a:solidFill>
                   <a:schemeClr val="bg1">
                     <a:lumMod val="60000"/>
@@ -28518,7 +28448,7 @@
                                         <p:tgtEl>
                                           <p:spTgt spid="15">
                                             <p:txEl>
-                                              <p:pRg st="0" end="0"/>
+                                              <p:pRg st="2" end="2"/>
                                             </p:txEl>
                                           </p:spTgt>
                                         </p:tgtEl>
@@ -28567,7 +28497,7 @@
                                         <p:tgtEl>
                                           <p:spTgt spid="15">
                                             <p:txEl>
-                                              <p:pRg st="1" end="1"/>
+                                              <p:pRg st="3" end="3"/>
                                             </p:txEl>
                                           </p:spTgt>
                                         </p:tgtEl>
@@ -28616,7 +28546,7 @@
                                         <p:tgtEl>
                                           <p:spTgt spid="15">
                                             <p:txEl>
-                                              <p:pRg st="2" end="2"/>
+                                              <p:pRg st="4" end="4"/>
                                             </p:txEl>
                                           </p:spTgt>
                                         </p:tgtEl>
@@ -28658,104 +28588,6 @@
                                     <p:set>
                                       <p:cBhvr>
                                         <p:cTn id="18" dur="1" fill="hold">
-                                          <p:stCondLst>
-                                            <p:cond delay="0"/>
-                                          </p:stCondLst>
-                                        </p:cTn>
-                                        <p:tgtEl>
-                                          <p:spTgt spid="15">
-                                            <p:txEl>
-                                              <p:pRg st="3" end="3"/>
-                                            </p:txEl>
-                                          </p:spTgt>
-                                        </p:tgtEl>
-                                        <p:attrNameLst>
-                                          <p:attrName>style.visibility</p:attrName>
-                                        </p:attrNameLst>
-                                      </p:cBhvr>
-                                      <p:to>
-                                        <p:strVal val="visible"/>
-                                      </p:to>
-                                    </p:set>
-                                  </p:childTnLst>
-                                </p:cTn>
-                              </p:par>
-                            </p:childTnLst>
-                          </p:cTn>
-                        </p:par>
-                      </p:childTnLst>
-                    </p:cTn>
-                  </p:par>
-                  <p:par>
-                    <p:cTn id="19" fill="hold">
-                      <p:stCondLst>
-                        <p:cond delay="indefinite"/>
-                      </p:stCondLst>
-                      <p:childTnLst>
-                        <p:par>
-                          <p:cTn id="20" fill="hold">
-                            <p:stCondLst>
-                              <p:cond delay="0"/>
-                            </p:stCondLst>
-                            <p:childTnLst>
-                              <p:par>
-                                <p:cTn id="21" presetID="1" presetClass="entr" presetSubtype="0" fill="hold" nodeType="clickEffect">
-                                  <p:stCondLst>
-                                    <p:cond delay="0"/>
-                                  </p:stCondLst>
-                                  <p:childTnLst>
-                                    <p:set>
-                                      <p:cBhvr>
-                                        <p:cTn id="22" dur="1" fill="hold">
-                                          <p:stCondLst>
-                                            <p:cond delay="0"/>
-                                          </p:stCondLst>
-                                        </p:cTn>
-                                        <p:tgtEl>
-                                          <p:spTgt spid="15">
-                                            <p:txEl>
-                                              <p:pRg st="4" end="4"/>
-                                            </p:txEl>
-                                          </p:spTgt>
-                                        </p:tgtEl>
-                                        <p:attrNameLst>
-                                          <p:attrName>style.visibility</p:attrName>
-                                        </p:attrNameLst>
-                                      </p:cBhvr>
-                                      <p:to>
-                                        <p:strVal val="visible"/>
-                                      </p:to>
-                                    </p:set>
-                                  </p:childTnLst>
-                                </p:cTn>
-                              </p:par>
-                            </p:childTnLst>
-                          </p:cTn>
-                        </p:par>
-                      </p:childTnLst>
-                    </p:cTn>
-                  </p:par>
-                  <p:par>
-                    <p:cTn id="23" fill="hold">
-                      <p:stCondLst>
-                        <p:cond delay="indefinite"/>
-                      </p:stCondLst>
-                      <p:childTnLst>
-                        <p:par>
-                          <p:cTn id="24" fill="hold">
-                            <p:stCondLst>
-                              <p:cond delay="0"/>
-                            </p:stCondLst>
-                            <p:childTnLst>
-                              <p:par>
-                                <p:cTn id="25" presetID="1" presetClass="entr" presetSubtype="0" fill="hold" nodeType="clickEffect">
-                                  <p:stCondLst>
-                                    <p:cond delay="0"/>
-                                  </p:stCondLst>
-                                  <p:childTnLst>
-                                    <p:set>
-                                      <p:cBhvr>
-                                        <p:cTn id="26" dur="1" fill="hold">
                                           <p:stCondLst>
                                             <p:cond delay="0"/>
                                           </p:stCondLst>
@@ -29378,7 +29210,7 @@
           <p:nvPr>
             <p:extLst>
               <p:ext uri="{D42A27DB-BD31-4B8C-83A1-F6EECF244321}">
-                <p14:modId xmlns:p14="http://schemas.microsoft.com/office/powerpoint/2010/main" val="1650565863"/>
+                <p14:modId xmlns:p14="http://schemas.microsoft.com/office/powerpoint/2010/main" val="2588015478"/>
               </p:ext>
             </p:extLst>
           </p:nvPr>
@@ -29567,7 +29399,7 @@
                         <a:defRPr/>
                       </a:pPr>
                       <a:r>
-                        <a:rPr lang="en-GB" sz="2800" b="1" i="0" u="none" strike="noStrike" kern="1200" cap="none" normalizeH="0" baseline="0" dirty="0">
+                        <a:rPr lang="bg-BG" sz="2800" b="1" i="0" u="none" strike="noStrike" kern="1200" cap="none" normalizeH="0" baseline="0" dirty="0">
                           <a:ln>
                             <a:noFill/>
                           </a:ln>
@@ -29579,7 +29411,7 @@
                           <a:ea typeface="+mn-ea"/>
                           <a:cs typeface="+mn-cs"/>
                         </a:rPr>
-                        <a:t>Колони</a:t>
+                        <a:t>Колона</a:t>
                       </a:r>
                       <a:endParaRPr kumimoji="1" lang="bg-BG" dirty="0"/>
                     </a:p>
@@ -31936,8 +31768,8 @@
         </p:nvSpPr>
         <p:spPr>
           <a:xfrm>
-            <a:off x="1807503" y="908645"/>
-            <a:ext cx="10129234" cy="5546589"/>
+            <a:off x="2082520" y="908645"/>
+            <a:ext cx="9953479" cy="5546589"/>
           </a:xfrm>
         </p:spPr>
         <p:txBody>
@@ -32014,7 +31846,23 @@
             </a:pPr>
             <a:r>
               <a:rPr lang="en-US" sz="3200" dirty="0"/>
-              <a:t>Най-често използваните многомерни масиви са от </a:t>
+              <a:t>Най-често използваните многомерни масиви са </a:t>
+            </a:r>
+            <a:r>
+              <a:rPr lang="bg-BG" sz="3200" dirty="0"/>
+              <a:t>с</a:t>
+            </a:r>
+            <a:r>
+              <a:rPr lang="en-US" sz="3200" dirty="0"/>
+              <a:t> </a:t>
+            </a:r>
+            <a:r>
+              <a:rPr lang="bg-BG" sz="3200" b="1" dirty="0">
+                <a:solidFill>
+                  <a:schemeClr val="bg1"/>
+                </a:solidFill>
+              </a:rPr>
+              <a:t>две </a:t>
             </a:r>
             <a:r>
               <a:rPr lang="en-US" sz="3200" b="1" dirty="0">
@@ -32022,7 +31870,7 @@
                   <a:schemeClr val="bg1"/>
                 </a:solidFill>
               </a:rPr>
-              <a:t>2-измерения</a:t>
+              <a:t>измерения</a:t>
             </a:r>
             <a:endParaRPr lang="en-US" sz="3200" b="1" dirty="0">
               <a:solidFill>
@@ -32405,33 +32253,15 @@
                                   </p:childTnLst>
                                 </p:cTn>
                               </p:par>
-                            </p:childTnLst>
-                          </p:cTn>
-                        </p:par>
-                      </p:childTnLst>
-                    </p:cTn>
-                  </p:par>
-                  <p:par>
-                    <p:cTn id="7" fill="hold">
-                      <p:stCondLst>
-                        <p:cond delay="indefinite"/>
-                      </p:stCondLst>
-                      <p:childTnLst>
-                        <p:par>
-                          <p:cTn id="8" fill="hold">
-                            <p:stCondLst>
-                              <p:cond delay="0"/>
-                            </p:stCondLst>
-                            <p:childTnLst>
                               <p:par>
-                                <p:cTn id="9" presetID="1" presetClass="entr" presetSubtype="0" fill="hold" nodeType="clickEffect">
+                                <p:cTn id="7" presetID="1" presetClass="entr" presetSubtype="0" fill="hold" nodeType="withEffect">
                                   <p:stCondLst>
                                     <p:cond delay="0"/>
                                   </p:stCondLst>
                                   <p:childTnLst>
                                     <p:set>
                                       <p:cBhvr>
-                                        <p:cTn id="10" dur="1" fill="hold">
+                                        <p:cTn id="8" dur="1" fill="hold">
                                           <p:stCondLst>
                                             <p:cond delay="0"/>
                                           </p:stCondLst>
@@ -32461,26 +32291,26 @@
                     </p:cTn>
                   </p:par>
                   <p:par>
-                    <p:cTn id="11" fill="hold">
+                    <p:cTn id="9" fill="hold">
                       <p:stCondLst>
                         <p:cond delay="indefinite"/>
                       </p:stCondLst>
                       <p:childTnLst>
                         <p:par>
-                          <p:cTn id="12" fill="hold">
+                          <p:cTn id="10" fill="hold">
                             <p:stCondLst>
                               <p:cond delay="0"/>
                             </p:stCondLst>
                             <p:childTnLst>
                               <p:par>
-                                <p:cTn id="13" presetID="1" presetClass="entr" presetSubtype="0" fill="hold" nodeType="clickEffect">
+                                <p:cTn id="11" presetID="1" presetClass="entr" presetSubtype="0" fill="hold" nodeType="clickEffect">
                                   <p:stCondLst>
                                     <p:cond delay="0"/>
                                   </p:stCondLst>
                                   <p:childTnLst>
                                     <p:set>
                                       <p:cBhvr>
-                                        <p:cTn id="14" dur="1" fill="hold">
+                                        <p:cTn id="12" dur="1" fill="hold">
                                           <p:stCondLst>
                                             <p:cond delay="0"/>
                                           </p:stCondLst>
@@ -32506,26 +32336,26 @@
                     </p:cTn>
                   </p:par>
                   <p:par>
-                    <p:cTn id="15" fill="hold">
+                    <p:cTn id="13" fill="hold">
                       <p:stCondLst>
                         <p:cond delay="indefinite"/>
                       </p:stCondLst>
                       <p:childTnLst>
                         <p:par>
-                          <p:cTn id="16" fill="hold">
+                          <p:cTn id="14" fill="hold">
                             <p:stCondLst>
                               <p:cond delay="0"/>
                             </p:stCondLst>
                             <p:childTnLst>
                               <p:par>
-                                <p:cTn id="17" presetID="1" presetClass="entr" presetSubtype="0" fill="hold" grpId="0" nodeType="clickEffect">
+                                <p:cTn id="15" presetID="1" presetClass="entr" presetSubtype="0" fill="hold" grpId="0" nodeType="clickEffect">
                                   <p:stCondLst>
                                     <p:cond delay="0"/>
                                   </p:stCondLst>
                                   <p:childTnLst>
                                     <p:set>
                                       <p:cBhvr>
-                                        <p:cTn id="18" dur="1" fill="hold">
+                                        <p:cTn id="16" dur="1" fill="hold">
                                           <p:stCondLst>
                                             <p:cond delay="0"/>
                                           </p:stCondLst>
@@ -32551,26 +32381,26 @@
                     </p:cTn>
                   </p:par>
                   <p:par>
-                    <p:cTn id="19" fill="hold">
+                    <p:cTn id="17" fill="hold">
                       <p:stCondLst>
                         <p:cond delay="indefinite"/>
                       </p:stCondLst>
                       <p:childTnLst>
                         <p:par>
-                          <p:cTn id="20" fill="hold">
+                          <p:cTn id="18" fill="hold">
                             <p:stCondLst>
                               <p:cond delay="0"/>
                             </p:stCondLst>
                             <p:childTnLst>
                               <p:par>
-                                <p:cTn id="21" presetID="1" presetClass="entr" presetSubtype="0" fill="hold" grpId="0" nodeType="clickEffect">
+                                <p:cTn id="19" presetID="1" presetClass="entr" presetSubtype="0" fill="hold" grpId="0" nodeType="clickEffect">
                                   <p:stCondLst>
                                     <p:cond delay="0"/>
                                   </p:stCondLst>
                                   <p:childTnLst>
                                     <p:set>
                                       <p:cBhvr>
-                                        <p:cTn id="22" dur="1" fill="hold">
+                                        <p:cTn id="20" dur="1" fill="hold">
                                           <p:stCondLst>
                                             <p:cond delay="0"/>
                                           </p:stCondLst>
@@ -32658,145 +32488,147 @@
           </a:bodyPr>
           <a:lstStyle/>
           <a:p>
-            <a:pPr marL="360045" indent="-360045">
-              <a:lnSpc>
-                <a:spcPct val="100000"/>
-              </a:lnSpc>
-              <a:buClr>
-                <a:srgbClr val="234465"/>
-              </a:buClr>
-            </a:pPr>
-            <a:r>
-              <a:rPr lang="en-US" sz="3600" dirty="0">
-                <a:ea typeface="+mn-lt"/>
-                <a:cs typeface="+mn-lt"/>
-              </a:rPr>
-              <a:t>Създаване на многомерен масив</a:t>
-            </a:r>
-          </a:p>
-          <a:p>
-            <a:pPr marL="837565" lvl="1" indent="-456565">
-              <a:lnSpc>
-                <a:spcPct val="100000"/>
-              </a:lnSpc>
-              <a:buClr>
-                <a:srgbClr val="234465"/>
-              </a:buClr>
-            </a:pPr>
-            <a:r>
-              <a:rPr lang="en-US" sz="3400" dirty="0"/>
-              <a:t>Използваме ключовата дума </a:t>
-            </a:r>
-            <a:r>
-              <a:rPr lang="en-US" sz="3400" b="1" dirty="0">
-                <a:solidFill>
-                  <a:schemeClr val="bg1"/>
-                </a:solidFill>
-              </a:rPr>
-              <a:t>new</a:t>
-            </a:r>
-            <a:endParaRPr lang="en-US" sz="3400" dirty="0">
-              <a:solidFill>
-                <a:schemeClr val="bg1"/>
-              </a:solidFill>
-              <a:cs typeface="Calibri"/>
-            </a:endParaRPr>
-          </a:p>
-          <a:p>
-            <a:pPr marL="837565" lvl="1" indent="-456565">
-              <a:lnSpc>
-                <a:spcPct val="100000"/>
-              </a:lnSpc>
-              <a:buClr>
-                <a:srgbClr val="234465"/>
-              </a:buClr>
-            </a:pPr>
-            <a:r>
-              <a:rPr lang="en-US" sz="3400" dirty="0"/>
-              <a:t>Трябва да се определи размера на всяко измерение</a:t>
-            </a:r>
-            <a:endParaRPr lang="en-US" sz="3400" dirty="0">
-              <a:cs typeface="Calibri"/>
-            </a:endParaRPr>
-          </a:p>
-          <a:p>
-            <a:pPr marL="837565" lvl="1" indent="-456565">
+            <a:pPr marL="394653" indent="-456565">
               <a:lnSpc>
                 <a:spcPct val="100000"/>
               </a:lnSpc>
               <a:spcAft>
-                <a:spcPts val="0"/>
+                <a:spcPts val="500"/>
               </a:spcAft>
               <a:buClr>
                 <a:srgbClr val="234465"/>
               </a:buClr>
             </a:pPr>
-            <a:endParaRPr lang="en-US" sz="3400" dirty="0">
-              <a:cs typeface="Calibri"/>
+            <a:r>
+              <a:rPr lang="bg-BG" sz="3600" dirty="0"/>
+              <a:t>Използваме ключовата дума </a:t>
+            </a:r>
+            <a:r>
+              <a:rPr lang="bg-BG" sz="3600" b="1" dirty="0">
+                <a:solidFill>
+                  <a:schemeClr val="bg1"/>
+                </a:solidFill>
+                <a:latin typeface="Consolas" panose="020B0609020204030204" pitchFamily="49" charset="0"/>
+                <a:cs typeface="Consolas" panose="020B0609020204030204" pitchFamily="49" charset="0"/>
+              </a:rPr>
+              <a:t>new</a:t>
+            </a:r>
+            <a:endParaRPr lang="bg-BG" sz="3600" dirty="0">
+              <a:solidFill>
+                <a:schemeClr val="bg1"/>
+              </a:solidFill>
+              <a:latin typeface="Consolas" panose="020B0609020204030204" pitchFamily="49" charset="0"/>
+              <a:cs typeface="Consolas" panose="020B0609020204030204" pitchFamily="49" charset="0"/>
             </a:endParaRPr>
           </a:p>
           <a:p>
-            <a:pPr marL="837565" lvl="1" indent="-456565">
+            <a:pPr marL="394653" indent="-456565">
               <a:lnSpc>
                 <a:spcPct val="100000"/>
               </a:lnSpc>
               <a:spcAft>
-                <a:spcPts val="0"/>
+                <a:spcPts val="500"/>
               </a:spcAft>
               <a:buClr>
                 <a:srgbClr val="234465"/>
               </a:buClr>
             </a:pPr>
-            <a:endParaRPr lang="en-US" sz="3400" dirty="0">
+            <a:r>
+              <a:rPr lang="bg-BG" sz="3600" dirty="0"/>
+              <a:t>Трябва да се определи </a:t>
+            </a:r>
+            <a:r>
+              <a:rPr lang="bg-BG" sz="3600" b="1" dirty="0">
+                <a:solidFill>
+                  <a:schemeClr val="bg1"/>
+                </a:solidFill>
+              </a:rPr>
+              <a:t>размера</a:t>
+            </a:r>
+            <a:r>
+              <a:rPr lang="bg-BG" sz="3600" dirty="0"/>
+              <a:t> на всяко измерение</a:t>
+            </a:r>
+            <a:endParaRPr lang="bg-BG" sz="3600" dirty="0">
               <a:cs typeface="Calibri"/>
             </a:endParaRPr>
           </a:p>
           <a:p>
-            <a:pPr marL="837565" lvl="1" indent="-456565">
+            <a:pPr marL="394653" indent="-456565">
               <a:lnSpc>
                 <a:spcPct val="100000"/>
               </a:lnSpc>
               <a:spcAft>
-                <a:spcPts val="0"/>
+                <a:spcPts val="500"/>
               </a:spcAft>
               <a:buClr>
                 <a:srgbClr val="234465"/>
               </a:buClr>
             </a:pPr>
-            <a:endParaRPr lang="en-US" sz="3400" dirty="0">
+            <a:endParaRPr lang="bg-BG" sz="3600" dirty="0">
               <a:cs typeface="Calibri"/>
             </a:endParaRPr>
           </a:p>
           <a:p>
-            <a:pPr marL="837565" lvl="1" indent="-456565">
+            <a:pPr marL="394653" indent="-456565">
               <a:lnSpc>
                 <a:spcPct val="100000"/>
               </a:lnSpc>
+              <a:spcAft>
+                <a:spcPts val="500"/>
+              </a:spcAft>
               <a:buClr>
                 <a:srgbClr val="234465"/>
               </a:buClr>
             </a:pPr>
-            <a:r>
-              <a:rPr lang="en-GB" sz="3400" dirty="0"/>
-              <a:t>Този синтаксис </a:t>
-            </a:r>
-            <a:r>
-              <a:rPr lang="bg-BG" sz="3400" dirty="0"/>
-              <a:t>се използва </a:t>
-            </a:r>
-            <a:r>
-              <a:rPr lang="en-GB" sz="3400" dirty="0"/>
-              <a:t>само </a:t>
-            </a:r>
-            <a:r>
-              <a:rPr lang="bg-BG" sz="3400" dirty="0"/>
-              <a:t>в</a:t>
-            </a:r>
-            <a:r>
-              <a:rPr lang="en-GB" sz="3400" dirty="0"/>
-              <a:t> C#</a:t>
-            </a:r>
-            <a:endParaRPr lang="en-US" sz="3400" dirty="0">
+            <a:endParaRPr lang="bg-BG" sz="3600" dirty="0">
+              <a:cs typeface="Calibri"/>
+            </a:endParaRPr>
+          </a:p>
+          <a:p>
+            <a:pPr marL="394653" indent="-456565">
+              <a:lnSpc>
+                <a:spcPct val="100000"/>
+              </a:lnSpc>
+              <a:spcAft>
+                <a:spcPts val="500"/>
+              </a:spcAft>
+              <a:buClr>
+                <a:srgbClr val="234465"/>
+              </a:buClr>
+            </a:pPr>
+            <a:endParaRPr lang="bg-BG" sz="3600" dirty="0">
+              <a:cs typeface="Calibri"/>
+            </a:endParaRPr>
+          </a:p>
+          <a:p>
+            <a:pPr marL="394653" indent="-456565">
+              <a:lnSpc>
+                <a:spcPct val="100000"/>
+              </a:lnSpc>
+              <a:spcAft>
+                <a:spcPts val="500"/>
+              </a:spcAft>
+              <a:buClr>
+                <a:srgbClr val="234465"/>
+              </a:buClr>
+            </a:pPr>
+            <a:r>
+              <a:rPr lang="bg-BG" sz="3600" dirty="0"/>
+              <a:t>Този синтаксис се използва </a:t>
+            </a:r>
+            <a:r>
+              <a:rPr lang="bg-BG" sz="3600" b="1" dirty="0">
+                <a:solidFill>
+                  <a:schemeClr val="bg1"/>
+                </a:solidFill>
+              </a:rPr>
+              <a:t>само в C#</a:t>
+            </a:r>
+            <a:endParaRPr lang="bg-BG" sz="3600" b="1" dirty="0">
+              <a:solidFill>
+                <a:schemeClr val="bg1"/>
+              </a:solidFill>
               <a:cs typeface="Calibri"/>
             </a:endParaRPr>
           </a:p>
@@ -32821,7 +32653,7 @@
           <a:p>
             <a:r>
               <a:rPr lang="en-US" sz="3950" dirty="0"/>
-              <a:t>Създаване на многомерен масив</a:t>
+              <a:t>Създаване на многомерен масив (1)</a:t>
             </a:r>
             <a:endParaRPr lang="en-US" dirty="0"/>
           </a:p>
@@ -32837,7 +32669,7 @@
         </p:nvSpPr>
         <p:spPr bwMode="auto">
           <a:xfrm>
-            <a:off x="2769052" y="3682390"/>
+            <a:off x="786000" y="2741505"/>
             <a:ext cx="7694195" cy="1632495"/>
           </a:xfrm>
           <a:prstGeom prst="rect">
@@ -33231,64 +33063,15 @@
                                   </p:childTnLst>
                                 </p:cTn>
                               </p:par>
-                            </p:childTnLst>
-                          </p:cTn>
-                        </p:par>
-                      </p:childTnLst>
-                    </p:cTn>
-                  </p:par>
-                  <p:par>
-                    <p:cTn id="7" fill="hold">
-                      <p:stCondLst>
-                        <p:cond delay="indefinite"/>
-                      </p:stCondLst>
-                      <p:childTnLst>
-                        <p:par>
-                          <p:cTn id="8" fill="hold">
-                            <p:stCondLst>
-                              <p:cond delay="0"/>
-                            </p:stCondLst>
-                            <p:childTnLst>
                               <p:par>
-                                <p:cTn id="9" presetID="1" presetClass="entr" presetSubtype="0" fill="hold" nodeType="clickEffect">
+                                <p:cTn id="7" presetID="1" presetClass="entr" presetSubtype="0" fill="hold" grpId="0" nodeType="withEffect">
                                   <p:stCondLst>
                                     <p:cond delay="0"/>
                                   </p:stCondLst>
                                   <p:childTnLst>
                                     <p:set>
                                       <p:cBhvr>
-                                        <p:cTn id="10" dur="1" fill="hold">
-                                          <p:stCondLst>
-                                            <p:cond delay="0"/>
-                                          </p:stCondLst>
-                                        </p:cTn>
-                                        <p:tgtEl>
-                                          <p:spTgt spid="3">
-                                            <p:txEl>
-                                              <p:pRg st="2" end="2"/>
-                                            </p:txEl>
-                                          </p:spTgt>
-                                        </p:tgtEl>
-                                        <p:attrNameLst>
-                                          <p:attrName>style.visibility</p:attrName>
-                                        </p:attrNameLst>
-                                      </p:cBhvr>
-                                      <p:to>
-                                        <p:strVal val="visible"/>
-                                      </p:to>
-                                    </p:set>
-                                  </p:childTnLst>
-                                </p:cTn>
-                              </p:par>
-                              <p:par>
-                                <p:cTn id="11" presetID="1" presetClass="entr" presetSubtype="0" fill="hold" grpId="0" nodeType="withEffect">
-                                  <p:stCondLst>
-                                    <p:cond delay="0"/>
-                                  </p:stCondLst>
-                                  <p:childTnLst>
-                                    <p:set>
-                                      <p:cBhvr>
-                                        <p:cTn id="12" dur="1" fill="hold">
+                                        <p:cTn id="8" dur="1" fill="hold">
                                           <p:stCondLst>
                                             <p:cond delay="0"/>
                                           </p:stCondLst>
@@ -33314,26 +33097,26 @@
                     </p:cTn>
                   </p:par>
                   <p:par>
-                    <p:cTn id="13" fill="hold">
+                    <p:cTn id="9" fill="hold">
                       <p:stCondLst>
                         <p:cond delay="indefinite"/>
                       </p:stCondLst>
                       <p:childTnLst>
                         <p:par>
-                          <p:cTn id="14" fill="hold">
+                          <p:cTn id="10" fill="hold">
                             <p:stCondLst>
                               <p:cond delay="0"/>
                             </p:stCondLst>
                             <p:childTnLst>
                               <p:par>
-                                <p:cTn id="15" presetID="1" presetClass="entr" presetSubtype="0" fill="hold" nodeType="clickEffect">
+                                <p:cTn id="11" presetID="1" presetClass="entr" presetSubtype="0" fill="hold" nodeType="clickEffect">
                                   <p:stCondLst>
                                     <p:cond delay="0"/>
                                   </p:stCondLst>
                                   <p:childTnLst>
                                     <p:set>
                                       <p:cBhvr>
-                                        <p:cTn id="16" dur="1" fill="hold">
+                                        <p:cTn id="12" dur="1" fill="hold">
                                           <p:stCondLst>
                                             <p:cond delay="0"/>
                                           </p:stCondLst>
@@ -33341,7 +33124,7 @@
                                         <p:tgtEl>
                                           <p:spTgt spid="3">
                                             <p:txEl>
-                                              <p:pRg st="6" end="6"/>
+                                              <p:pRg st="5" end="5"/>
                                             </p:txEl>
                                           </p:spTgt>
                                         </p:tgtEl>
@@ -33612,7 +33395,15 @@
             </a:pPr>
             <a:r>
               <a:rPr lang="en-US" sz="3600" dirty="0"/>
-              <a:t>Създаване чрез стойности:</a:t>
+              <a:t>Създаване </a:t>
+            </a:r>
+            <a:r>
+              <a:rPr lang="bg-BG" sz="3600" dirty="0"/>
+              <a:t>със</a:t>
+            </a:r>
+            <a:r>
+              <a:rPr lang="en-US" sz="3600" dirty="0"/>
+              <a:t> стойности:</a:t>
             </a:r>
             <a:endParaRPr lang="bg-BG" dirty="0"/>
           </a:p>
@@ -33709,8 +33500,56 @@
               </a:buClr>
             </a:pPr>
             <a:r>
+              <a:rPr lang="bg-BG" sz="3600" b="1" dirty="0">
+                <a:solidFill>
+                  <a:schemeClr val="bg1"/>
+                </a:solidFill>
+              </a:rPr>
+              <a:t>Редовете</a:t>
+            </a:r>
+            <a:r>
+              <a:rPr lang="bg-BG" sz="3600" dirty="0"/>
+              <a:t> </a:t>
+            </a:r>
+            <a:r>
               <a:rPr lang="en-US" sz="3600" dirty="0"/>
-              <a:t>Редиците са първото измерение, а колоните са второто </a:t>
+              <a:t>са </a:t>
+            </a:r>
+            <a:r>
+              <a:rPr lang="en-US" sz="3600" b="1" dirty="0">
+                <a:solidFill>
+                  <a:schemeClr val="bg1"/>
+                </a:solidFill>
+              </a:rPr>
+              <a:t>първото</a:t>
+            </a:r>
+            <a:r>
+              <a:rPr lang="en-US" sz="3600" dirty="0"/>
+              <a:t> измерение, а </a:t>
+            </a:r>
+            <a:r>
+              <a:rPr lang="en-US" sz="3600" b="1" dirty="0">
+                <a:solidFill>
+                  <a:schemeClr val="bg1"/>
+                </a:solidFill>
+              </a:rPr>
+              <a:t>колоните</a:t>
+            </a:r>
+            <a:r>
+              <a:rPr lang="en-US" sz="3600" dirty="0"/>
+              <a:t> са </a:t>
+            </a:r>
+            <a:r>
+              <a:rPr lang="en-US" sz="3600" b="1" dirty="0">
+                <a:solidFill>
+                  <a:schemeClr val="bg1"/>
+                </a:solidFill>
+              </a:rPr>
+              <a:t>второто</a:t>
+            </a:r>
+            <a:r>
+              <a:rPr lang="en-US" sz="3600" dirty="0"/>
+              <a:t> </a:t>
             </a:r>
             <a:endParaRPr lang="en-US" sz="3600" dirty="0">
               <a:cs typeface="Calibri"/>
@@ -33769,7 +33608,7 @@
                 <a:ea typeface="+mj-lt"/>
                 <a:cs typeface="+mj-lt"/>
               </a:rPr>
-              <a:t>Създаване на многомерен масив</a:t>
+              <a:t>Създаване на многомерен масив (2)</a:t>
             </a:r>
             <a:endParaRPr lang="en-US" sz="3950" b="0" dirty="0">
               <a:ea typeface="+mj-lt"/>
@@ -34103,7 +33942,7 @@
                                         <p:tgtEl>
                                           <p:spTgt spid="15">
                                             <p:txEl>
-                                              <p:pRg st="0" end="0"/>
+                                              <p:pRg st="5" end="5"/>
                                             </p:txEl>
                                           </p:spTgt>
                                         </p:tgtEl>
@@ -34152,7 +33991,7 @@
                                         <p:tgtEl>
                                           <p:spTgt spid="15">
                                             <p:txEl>
-                                              <p:pRg st="5" end="5"/>
+                                              <p:pRg st="6" end="6"/>
                                             </p:txEl>
                                           </p:spTgt>
                                         </p:tgtEl>
@@ -34194,55 +34033,6 @@
                                     <p:set>
                                       <p:cBhvr>
                                         <p:cTn id="14" dur="1" fill="hold">
-                                          <p:stCondLst>
-                                            <p:cond delay="0"/>
-                                          </p:stCondLst>
-                                        </p:cTn>
-                                        <p:tgtEl>
-                                          <p:spTgt spid="15">
-                                            <p:txEl>
-                                              <p:pRg st="6" end="6"/>
-                                            </p:txEl>
-                                          </p:spTgt>
-                                        </p:tgtEl>
-                                        <p:attrNameLst>
-                                          <p:attrName>style.visibility</p:attrName>
-                                        </p:attrNameLst>
-                                      </p:cBhvr>
-                                      <p:to>
-                                        <p:strVal val="visible"/>
-                                      </p:to>
-                                    </p:set>
-                                  </p:childTnLst>
-                                </p:cTn>
-                              </p:par>
-                            </p:childTnLst>
-                          </p:cTn>
-                        </p:par>
-                      </p:childTnLst>
-                    </p:cTn>
-                  </p:par>
-                  <p:par>
-                    <p:cTn id="15" fill="hold">
-                      <p:stCondLst>
-                        <p:cond delay="indefinite"/>
-                      </p:stCondLst>
-                      <p:childTnLst>
-                        <p:par>
-                          <p:cTn id="16" fill="hold">
-                            <p:stCondLst>
-                              <p:cond delay="0"/>
-                            </p:stCondLst>
-                            <p:childTnLst>
-                              <p:par>
-                                <p:cTn id="17" presetID="1" presetClass="entr" presetSubtype="0" fill="hold" nodeType="clickEffect">
-                                  <p:stCondLst>
-                                    <p:cond delay="0"/>
-                                  </p:stCondLst>
-                                  <p:childTnLst>
-                                    <p:set>
-                                      <p:cBhvr>
-                                        <p:cTn id="18" dur="1" fill="hold">
                                           <p:stCondLst>
                                             <p:cond delay="0"/>
                                           </p:stCondLst>
@@ -34510,6 +34300,58 @@
               <a:lnSpc>
                 <a:spcPct val="100000"/>
               </a:lnSpc>
+              <a:spcAft>
+                <a:spcPts val="2000"/>
+              </a:spcAft>
+              <a:buClr>
+                <a:srgbClr val="234465"/>
+              </a:buClr>
+            </a:pPr>
+            <a:r>
+              <a:rPr lang="en-US" sz="3600" b="1" dirty="0">
+                <a:solidFill>
+                  <a:schemeClr val="bg1"/>
+                </a:solidFill>
+              </a:rPr>
+              <a:t>Взимане </a:t>
+            </a:r>
+            <a:r>
+              <a:rPr lang="en-US" sz="3600" dirty="0">
+                <a:solidFill>
+                  <a:srgbClr val="234465"/>
+                </a:solidFill>
+              </a:rPr>
+              <a:t>на стойност</a:t>
+            </a:r>
+            <a:r>
+              <a:rPr lang="bg-BG" sz="3600" dirty="0">
+                <a:solidFill>
+                  <a:srgbClr val="234465"/>
+                </a:solidFill>
+              </a:rPr>
+              <a:t>т</a:t>
+            </a:r>
+            <a:r>
+              <a:rPr lang="en-US" sz="3600" dirty="0">
+                <a:solidFill>
+                  <a:srgbClr val="234465"/>
+                </a:solidFill>
+              </a:rPr>
+              <a:t>а на елемента</a:t>
+            </a:r>
+            <a:r>
+              <a:rPr lang="en-US" sz="3600" dirty="0"/>
+              <a:t>:</a:t>
+            </a:r>
+            <a:endParaRPr lang="en-US" sz="3600" dirty="0">
+              <a:cs typeface="Calibri"/>
+            </a:endParaRPr>
+          </a:p>
+          <a:p>
+            <a:pPr marL="360045" indent="-360045">
+              <a:lnSpc>
+                <a:spcPct val="100000"/>
+              </a:lnSpc>
               <a:spcBef>
                 <a:spcPct val="0"/>
               </a:spcBef>
@@ -34520,27 +34362,9 @@
                 <a:srgbClr val="234465"/>
               </a:buClr>
             </a:pPr>
-            <a:r>
-              <a:rPr lang="en-US" sz="3350" dirty="0">
-                <a:solidFill>
-                  <a:srgbClr val="234465"/>
-                </a:solidFill>
-              </a:rPr>
-              <a:t>Достъп до елемент от </a:t>
-            </a:r>
-            <a:r>
-              <a:rPr lang="en-US" sz="3350" b="1" dirty="0">
-                <a:solidFill>
-                  <a:schemeClr val="bg1"/>
-                </a:solidFill>
-              </a:rPr>
-              <a:t>масив с N измерения</a:t>
-            </a:r>
-            <a:r>
-              <a:rPr lang="en-US" sz="3350" dirty="0"/>
-              <a:t>:</a:t>
-            </a:r>
-            <a:endParaRPr lang="bg-BG" sz="3350" dirty="0"/>
+            <a:endParaRPr lang="en-US" sz="3600" dirty="0">
+              <a:cs typeface="Calibri"/>
+            </a:endParaRPr>
           </a:p>
           <a:p>
             <a:pPr marL="456565" indent="-456565">
@@ -34557,7 +34381,7 @@
                 <a:srgbClr val="234465"/>
               </a:buClr>
             </a:pPr>
-            <a:endParaRPr lang="en-US" dirty="0">
+            <a:endParaRPr lang="en-US" sz="3600" dirty="0">
               <a:cs typeface="Calibri"/>
             </a:endParaRPr>
           </a:p>
@@ -34566,60 +34390,8 @@
               <a:lnSpc>
                 <a:spcPct val="100000"/>
               </a:lnSpc>
-              <a:spcAft>
-                <a:spcPct val="0"/>
-              </a:spcAft>
-              <a:buClr>
-                <a:srgbClr val="234465"/>
-              </a:buClr>
-            </a:pPr>
-            <a:r>
-              <a:rPr lang="en-US" sz="3350" b="1" dirty="0">
-                <a:solidFill>
-                  <a:schemeClr val="bg1"/>
-                </a:solidFill>
-              </a:rPr>
-              <a:t>Взимане </a:t>
-            </a:r>
-            <a:r>
-              <a:rPr lang="en-US" sz="3350" dirty="0">
-                <a:solidFill>
-                  <a:srgbClr val="234465"/>
-                </a:solidFill>
-              </a:rPr>
-              <a:t>на стойност</a:t>
-            </a:r>
-            <a:r>
-              <a:rPr lang="bg-BG" sz="3350" dirty="0">
-                <a:solidFill>
-                  <a:srgbClr val="234465"/>
-                </a:solidFill>
-              </a:rPr>
-              <a:t>т</a:t>
-            </a:r>
-            <a:r>
-              <a:rPr lang="en-US" sz="3350" dirty="0">
-                <a:solidFill>
-                  <a:srgbClr val="234465"/>
-                </a:solidFill>
-              </a:rPr>
-              <a:t>а на елемента</a:t>
-            </a:r>
-            <a:r>
-              <a:rPr lang="en-US" sz="3350" dirty="0"/>
-              <a:t>:</a:t>
-            </a:r>
-            <a:endParaRPr lang="en-US" sz="3350" dirty="0">
-              <a:cs typeface="Calibri"/>
-            </a:endParaRPr>
-          </a:p>
-          <a:p>
-            <a:pPr marL="360045" indent="-360045">
-              <a:lnSpc>
-                <a:spcPct val="100000"/>
-              </a:lnSpc>
               <a:spcBef>
-                <a:spcPct val="0"/>
+                <a:spcPts val="1000"/>
               </a:spcBef>
               <a:spcAft>
                 <a:spcPct val="0"/>
@@ -34628,46 +34400,8 @@
                 <a:srgbClr val="234465"/>
               </a:buClr>
             </a:pPr>
-            <a:endParaRPr lang="en-US" dirty="0">
-              <a:cs typeface="Calibri"/>
-            </a:endParaRPr>
-          </a:p>
-          <a:p>
-            <a:pPr marL="456565" indent="-456565">
-              <a:lnSpc>
-                <a:spcPct val="100000"/>
-              </a:lnSpc>
-              <a:spcBef>
-                <a:spcPct val="0"/>
-              </a:spcBef>
-              <a:spcAft>
-                <a:spcPct val="0"/>
-              </a:spcAft>
-              <a:buClr>
-                <a:srgbClr val="234465"/>
-              </a:buClr>
-            </a:pPr>
-            <a:endParaRPr lang="en-US" dirty="0">
-              <a:cs typeface="Calibri"/>
-            </a:endParaRPr>
-          </a:p>
-          <a:p>
-            <a:pPr marL="456565" indent="-456565">
-              <a:lnSpc>
-                <a:spcPct val="100000"/>
-              </a:lnSpc>
-              <a:spcBef>
-                <a:spcPct val="0"/>
-              </a:spcBef>
-              <a:spcAft>
-                <a:spcPct val="0"/>
-              </a:spcAft>
-              <a:buClr>
-                <a:srgbClr val="234465"/>
-              </a:buClr>
-            </a:pPr>
-            <a:r>
-              <a:rPr lang="bg-BG" sz="3350" b="1" dirty="0">
+            <a:r>
+              <a:rPr lang="bg-BG" sz="3600" b="1" dirty="0">
                 <a:solidFill>
                   <a:schemeClr val="bg1"/>
                 </a:solidFill>
@@ -34675,7 +34409,7 @@
               <a:t>Задаване</a:t>
             </a:r>
             <a:r>
-              <a:rPr lang="en-US" sz="3350" b="1" dirty="0">
+              <a:rPr lang="en-US" sz="3600" b="1" dirty="0">
                 <a:solidFill>
                   <a:schemeClr val="bg1"/>
                 </a:solidFill>
@@ -34683,7 +34417,7 @@
               <a:t> </a:t>
             </a:r>
             <a:r>
-              <a:rPr lang="en-US" sz="3350" dirty="0">
+              <a:rPr lang="en-US" sz="3600" dirty="0">
                 <a:solidFill>
                   <a:srgbClr val="234465"/>
                 </a:solidFill>
@@ -34691,10 +34425,10 @@
               <a:t>на</a:t>
             </a:r>
             <a:r>
-              <a:rPr lang="en-US" sz="3350" dirty="0"/>
+              <a:rPr lang="en-US" sz="3600" dirty="0"/>
               <a:t> стойност на елемента:</a:t>
             </a:r>
-            <a:endParaRPr lang="en-US" sz="3350" dirty="0">
+            <a:endParaRPr lang="en-US" sz="3600" dirty="0">
               <a:cs typeface="Calibri"/>
             </a:endParaRPr>
           </a:p>
@@ -34739,116 +34473,6 @@
       </p:sp>
       <p:sp>
         <p:nvSpPr>
-          <p:cNvPr id="16" name="Rectangle 4">
-            <a:extLst>
-              <a:ext uri="{FF2B5EF4-FFF2-40B4-BE49-F238E27FC236}">
-                <a16:creationId xmlns:a16="http://schemas.microsoft.com/office/drawing/2014/main" id="{62FCDFFF-9A1D-47B8-9ED9-A426AD336907}"/>
-              </a:ext>
-            </a:extLst>
-          </p:cNvPr>
-          <p:cNvSpPr>
-            <a:spLocks noChangeArrowheads="1"/>
-          </p:cNvSpPr>
-          <p:nvPr/>
-        </p:nvSpPr>
-        <p:spPr bwMode="auto">
-          <a:xfrm>
-            <a:off x="694916" y="1819288"/>
-            <a:ext cx="9071903" cy="430775"/>
-          </a:xfrm>
-          <a:prstGeom prst="rect">
-            <a:avLst/>
-          </a:prstGeom>
-          <a:solidFill>
-            <a:schemeClr val="accent5">
-              <a:lumMod val="40000"/>
-              <a:lumOff val="60000"/>
-              <a:alpha val="15000"/>
-            </a:schemeClr>
-          </a:solidFill>
-          <a:ln w="12700">
-            <a:solidFill>
-              <a:schemeClr val="accent5">
-                <a:lumMod val="60000"/>
-                <a:lumOff val="40000"/>
-              </a:schemeClr>
-            </a:solidFill>
-          </a:ln>
-        </p:spPr>
-        <p:txBody>
-          <a:bodyPr wrap="square" lIns="91440" tIns="45720" rIns="91440" bIns="45720" anchor="t">
-            <a:spAutoFit/>
-          </a:bodyPr>
-          <a:lstStyle/>
-          <a:p>
-            <a:pPr eaLnBrk="0" hangingPunct="0">
-              <a:buClr>
-                <a:schemeClr val="accent5">
-                  <a:lumMod val="40000"/>
-                  <a:lumOff val="60000"/>
-                </a:schemeClr>
-              </a:buClr>
-              <a:buSzPct val="70000"/>
-            </a:pPr>
-            <a:r>
-              <a:rPr lang="en-US" sz="2150" b="1" noProof="1">
-                <a:latin typeface="Consolas"/>
-                <a:cs typeface="Consolas" pitchFamily="49" charset="0"/>
-              </a:rPr>
-              <a:t>nDimensionalArray[</a:t>
-            </a:r>
-            <a:r>
-              <a:rPr lang="en-US" sz="2150" b="1" noProof="1">
-                <a:solidFill>
-                  <a:schemeClr val="bg1"/>
-                </a:solidFill>
-                <a:latin typeface="Consolas"/>
-                <a:cs typeface="Consolas" pitchFamily="49" charset="0"/>
-              </a:rPr>
-              <a:t>индекс</a:t>
-            </a:r>
-            <a:r>
-              <a:rPr lang="en-US" sz="2150" b="1" baseline="-25000" noProof="1">
-                <a:solidFill>
-                  <a:schemeClr val="bg1"/>
-                </a:solidFill>
-                <a:latin typeface="Consolas"/>
-                <a:cs typeface="Consolas" pitchFamily="49" charset="0"/>
-              </a:rPr>
-              <a:t>1</a:t>
-            </a:r>
-            <a:r>
-              <a:rPr lang="en-US" sz="2150" b="1" noProof="1">
-                <a:solidFill>
-                  <a:schemeClr val="bg1"/>
-                </a:solidFill>
-                <a:latin typeface="Consolas"/>
-                <a:cs typeface="Consolas" pitchFamily="49" charset="0"/>
-              </a:rPr>
-              <a:t>, … , индекс</a:t>
-            </a:r>
-            <a:r>
-              <a:rPr lang="en-US" sz="2150" b="1" baseline="-25000" noProof="1">
-                <a:solidFill>
-                  <a:schemeClr val="bg1"/>
-                </a:solidFill>
-                <a:latin typeface="Consolas"/>
-                <a:cs typeface="Consolas" pitchFamily="49" charset="0"/>
-              </a:rPr>
-              <a:t>n</a:t>
-            </a:r>
-            <a:r>
-              <a:rPr lang="en-US" sz="2150" b="1" noProof="1">
-                <a:latin typeface="Consolas"/>
-                <a:cs typeface="Consolas" pitchFamily="49" charset="0"/>
-              </a:rPr>
-              <a:t>]</a:t>
-            </a:r>
-          </a:p>
-        </p:txBody>
-      </p:sp>
-      <p:sp>
-        <p:nvSpPr>
           <p:cNvPr id="17" name="Rectangle 16">
             <a:extLst>
               <a:ext uri="{FF2B5EF4-FFF2-40B4-BE49-F238E27FC236}">
@@ -34863,8 +34487,8 @@
         </p:nvSpPr>
         <p:spPr bwMode="auto">
           <a:xfrm>
-            <a:off x="694917" y="2996952"/>
-            <a:ext cx="9071902" cy="769241"/>
+            <a:off x="694918" y="1974655"/>
+            <a:ext cx="9451081" cy="954107"/>
           </a:xfrm>
           <a:prstGeom prst="rect">
             <a:avLst/>
@@ -34901,7 +34525,7 @@
               <a:buSzPct val="70000"/>
             </a:pPr>
             <a:r>
-              <a:rPr lang="en-US" sz="2199" b="1" noProof="1">
+              <a:rPr lang="en-US" sz="2800" b="1" noProof="1">
                 <a:solidFill>
                   <a:schemeClr val="bg1"/>
                 </a:solidFill>
@@ -34911,7 +34535,7 @@
               <a:t>int[,]</a:t>
             </a:r>
             <a:r>
-              <a:rPr lang="en-US" sz="2199" b="1" noProof="1">
+              <a:rPr lang="en-US" sz="2800" b="1" noProof="1">
                 <a:solidFill>
                   <a:schemeClr val="tx1">
                     <a:lumMod val="75000"/>
@@ -34923,14 +34547,14 @@
               <a:t> </a:t>
             </a:r>
             <a:r>
-              <a:rPr lang="en-US" sz="2199" b="1" noProof="1">
+              <a:rPr lang="en-US" sz="2800" b="1" noProof="1">
                 <a:latin typeface="Consolas" pitchFamily="49" charset="0"/>
                 <a:cs typeface="Consolas" pitchFamily="49" charset="0"/>
               </a:rPr>
               <a:t>array = </a:t>
             </a:r>
             <a:r>
-              <a:rPr lang="en-US" sz="2199" b="1" noProof="1">
+              <a:rPr lang="en-US" sz="2800" b="1" noProof="1">
                 <a:solidFill>
                   <a:schemeClr val="bg1"/>
                 </a:solidFill>
@@ -34951,14 +34575,14 @@
               <a:buSzPct val="70000"/>
             </a:pPr>
             <a:r>
-              <a:rPr lang="en-US" sz="2199" b="1" noProof="1">
+              <a:rPr lang="en-US" sz="2800" b="1" noProof="1">
                 <a:latin typeface="Consolas" pitchFamily="49" charset="0"/>
                 <a:cs typeface="Consolas" pitchFamily="49" charset="0"/>
               </a:rPr>
               <a:t>int element11 = array[1, 1];</a:t>
             </a:r>
             <a:r>
-              <a:rPr lang="en-US" sz="2199" b="1" noProof="1">
+              <a:rPr lang="en-US" sz="2800" b="1" noProof="1">
                 <a:solidFill>
                   <a:schemeClr val="tx1">
                     <a:lumMod val="75000"/>
@@ -34970,7 +34594,7 @@
               <a:t> </a:t>
             </a:r>
             <a:r>
-              <a:rPr lang="en-US" sz="2199" b="1" i="1" noProof="1">
+              <a:rPr lang="en-US" sz="2800" b="1" i="1" noProof="1">
                 <a:solidFill>
                   <a:schemeClr val="accent2"/>
                 </a:solidFill>
@@ -34998,8 +34622,8 @@
         </p:nvSpPr>
         <p:spPr bwMode="auto">
           <a:xfrm>
-            <a:off x="694917" y="4596156"/>
-            <a:ext cx="9071904" cy="1569148"/>
+            <a:off x="694917" y="4078615"/>
+            <a:ext cx="11058113" cy="1815882"/>
           </a:xfrm>
           <a:prstGeom prst="rect">
             <a:avLst/>
@@ -35036,7 +34660,7 @@
               <a:buSzPct val="70000"/>
             </a:pPr>
             <a:r>
-              <a:rPr lang="en-US" sz="2399" b="1" noProof="1">
+              <a:rPr lang="en-US" sz="2800" b="1" noProof="1">
                 <a:latin typeface="Consolas" pitchFamily="49" charset="0"/>
                 <a:cs typeface="Consolas" pitchFamily="49" charset="0"/>
               </a:rPr>
@@ -35054,14 +34678,14 @@
               <a:buSzPct val="70000"/>
             </a:pPr>
             <a:r>
-              <a:rPr lang="en-US" sz="2399" b="1" noProof="1">
+              <a:rPr lang="en-US" sz="2800" b="1" noProof="1">
                 <a:latin typeface="Consolas" pitchFamily="49" charset="0"/>
                 <a:cs typeface="Consolas" pitchFamily="49" charset="0"/>
               </a:rPr>
               <a:t>for (int row = 0; row &lt; </a:t>
             </a:r>
             <a:r>
-              <a:rPr lang="en-US" sz="2399" b="1" noProof="1">
+              <a:rPr lang="en-US" sz="2800" b="1" noProof="1">
                 <a:solidFill>
                   <a:schemeClr val="bg1"/>
                 </a:solidFill>
@@ -35071,7 +34695,7 @@
               <a:t>array.GetLength(0); </a:t>
             </a:r>
             <a:r>
-              <a:rPr lang="en-US" sz="2399" b="1" noProof="1">
+              <a:rPr lang="en-US" sz="2800" b="1" noProof="1">
                 <a:latin typeface="Consolas" pitchFamily="49" charset="0"/>
                 <a:cs typeface="Consolas" pitchFamily="49" charset="0"/>
               </a:rPr>
@@ -35089,7 +34713,7 @@
               <a:buSzPct val="70000"/>
             </a:pPr>
             <a:r>
-              <a:rPr lang="en-US" sz="2399" b="1" noProof="1">
+              <a:rPr lang="en-US" sz="2800" b="1" noProof="1">
                 <a:latin typeface="Consolas" pitchFamily="49" charset="0"/>
                 <a:cs typeface="Consolas" pitchFamily="49" charset="0"/>
               </a:rPr>
@@ -35107,7 +34731,7 @@
               <a:buSzPct val="70000"/>
             </a:pPr>
             <a:r>
-              <a:rPr lang="en-US" sz="2399" b="1" noProof="1">
+              <a:rPr lang="en-US" sz="2800" b="1" noProof="1">
                 <a:solidFill>
                   <a:schemeClr val="tx1">
                     <a:lumMod val="75000"/>
@@ -35119,7 +34743,7 @@
               <a:t>    </a:t>
             </a:r>
             <a:r>
-              <a:rPr lang="en-US" sz="2399" b="1" noProof="1">
+              <a:rPr lang="en-US" sz="2800" b="1" noProof="1">
                 <a:solidFill>
                   <a:schemeClr val="bg1"/>
                 </a:solidFill>
@@ -35147,7 +34771,7 @@
         </p:nvSpPr>
         <p:spPr bwMode="auto">
           <a:xfrm>
-            <a:off x="7917308" y="4059000"/>
+            <a:off x="8706000" y="3478336"/>
             <a:ext cx="2713608" cy="908989"/>
           </a:xfrm>
           <a:prstGeom prst="wedgeRoundRectCallout">
@@ -35430,64 +35054,15 @@
                                   </p:childTnLst>
                                 </p:cTn>
                               </p:par>
-                            </p:childTnLst>
-                          </p:cTn>
-                        </p:par>
-                      </p:childTnLst>
-                    </p:cTn>
-                  </p:par>
-                  <p:par>
-                    <p:cTn id="7" fill="hold">
-                      <p:stCondLst>
-                        <p:cond delay="indefinite"/>
-                      </p:stCondLst>
-                      <p:childTnLst>
-                        <p:par>
-                          <p:cTn id="8" fill="hold">
-                            <p:stCondLst>
-                              <p:cond delay="0"/>
-                            </p:stCondLst>
-                            <p:childTnLst>
                               <p:par>
-                                <p:cTn id="9" presetID="1" presetClass="entr" presetSubtype="0" fill="hold" nodeType="clickEffect">
+                                <p:cTn id="7" presetID="1" presetClass="entr" presetSubtype="0" fill="hold" grpId="0" nodeType="withEffect">
                                   <p:stCondLst>
                                     <p:cond delay="0"/>
                                   </p:stCondLst>
                                   <p:childTnLst>
                                     <p:set>
                                       <p:cBhvr>
-                                        <p:cTn id="10" dur="1" fill="hold">
-                                          <p:stCondLst>
-                                            <p:cond delay="0"/>
-                                          </p:stCondLst>
-                                        </p:cTn>
-                                        <p:tgtEl>
-                                          <p:spTgt spid="14">
-                                            <p:txEl>
-                                              <p:pRg st="2" end="2"/>
-                                            </p:txEl>
-                                          </p:spTgt>
-                                        </p:tgtEl>
-                                        <p:attrNameLst>
-                                          <p:attrName>style.visibility</p:attrName>
-                                        </p:attrNameLst>
-                                      </p:cBhvr>
-                                      <p:to>
-                                        <p:strVal val="visible"/>
-                                      </p:to>
-                                    </p:set>
-                                  </p:childTnLst>
-                                </p:cTn>
-                              </p:par>
-                              <p:par>
-                                <p:cTn id="11" presetID="1" presetClass="entr" presetSubtype="0" fill="hold" grpId="0" nodeType="withEffect">
-                                  <p:stCondLst>
-                                    <p:cond delay="0"/>
-                                  </p:stCondLst>
-                                  <p:childTnLst>
-                                    <p:set>
-                                      <p:cBhvr>
-                                        <p:cTn id="12" dur="1" fill="hold">
+                                        <p:cTn id="8" dur="1" fill="hold">
                                           <p:stCondLst>
                                             <p:cond delay="0"/>
                                           </p:stCondLst>
@@ -35513,26 +35088,26 @@
                     </p:cTn>
                   </p:par>
                   <p:par>
-                    <p:cTn id="13" fill="hold">
+                    <p:cTn id="9" fill="hold">
                       <p:stCondLst>
                         <p:cond delay="indefinite"/>
                       </p:stCondLst>
                       <p:childTnLst>
                         <p:par>
-                          <p:cTn id="14" fill="hold">
+                          <p:cTn id="10" fill="hold">
                             <p:stCondLst>
                               <p:cond delay="0"/>
                             </p:stCondLst>
                             <p:childTnLst>
                               <p:par>
-                                <p:cTn id="15" presetID="1" presetClass="entr" presetSubtype="0" fill="hold" nodeType="clickEffect">
+                                <p:cTn id="11" presetID="1" presetClass="entr" presetSubtype="0" fill="hold" nodeType="clickEffect">
                                   <p:stCondLst>
                                     <p:cond delay="0"/>
                                   </p:stCondLst>
                                   <p:childTnLst>
                                     <p:set>
                                       <p:cBhvr>
-                                        <p:cTn id="16" dur="1" fill="hold">
+                                        <p:cTn id="12" dur="1" fill="hold">
                                           <p:stCondLst>
                                             <p:cond delay="0"/>
                                           </p:stCondLst>
@@ -35540,7 +35115,7 @@
                                         <p:tgtEl>
                                           <p:spTgt spid="14">
                                             <p:txEl>
-                                              <p:pRg st="5" end="5"/>
+                                              <p:pRg st="3" end="3"/>
                                             </p:txEl>
                                           </p:spTgt>
                                         </p:tgtEl>
@@ -35556,14 +35131,14 @@
                                 </p:cTn>
                               </p:par>
                               <p:par>
-                                <p:cTn id="17" presetID="1" presetClass="entr" presetSubtype="0" fill="hold" grpId="0" nodeType="withEffect">
+                                <p:cTn id="13" presetID="1" presetClass="entr" presetSubtype="0" fill="hold" grpId="0" nodeType="withEffect">
                                   <p:stCondLst>
                                     <p:cond delay="0"/>
                                   </p:stCondLst>
                                   <p:childTnLst>
                                     <p:set>
                                       <p:cBhvr>
-                                        <p:cTn id="18" dur="1" fill="hold">
+                                        <p:cTn id="14" dur="1" fill="hold">
                                           <p:stCondLst>
                                             <p:cond delay="0"/>
                                           </p:stCondLst>
@@ -35589,26 +35164,26 @@
                     </p:cTn>
                   </p:par>
                   <p:par>
-                    <p:cTn id="19" fill="hold">
+                    <p:cTn id="15" fill="hold">
                       <p:stCondLst>
                         <p:cond delay="indefinite"/>
                       </p:stCondLst>
                       <p:childTnLst>
                         <p:par>
-                          <p:cTn id="20" fill="hold">
+                          <p:cTn id="16" fill="hold">
                             <p:stCondLst>
                               <p:cond delay="0"/>
                             </p:stCondLst>
                             <p:childTnLst>
                               <p:par>
-                                <p:cTn id="21" presetID="1" presetClass="entr" presetSubtype="0" fill="hold" grpId="0" nodeType="clickEffect">
+                                <p:cTn id="17" presetID="1" presetClass="entr" presetSubtype="0" fill="hold" grpId="0" nodeType="clickEffect">
                                   <p:stCondLst>
                                     <p:cond delay="0"/>
                                   </p:stCondLst>
                                   <p:childTnLst>
                                     <p:set>
                                       <p:cBhvr>
-                                        <p:cTn id="22" dur="1" fill="hold">
+                                        <p:cTn id="18" dur="1" fill="hold">
                                           <p:stCondLst>
                                             <p:cond delay="0"/>
                                           </p:stCondLst>
@@ -35711,8 +35286,8 @@
               <a:t>Отпечатване на матрица – </a:t>
             </a:r>
             <a:r>
-              <a:rPr lang="en-US" sz="3950" dirty="0" err="1"/>
-              <a:t>пример</a:t>
+              <a:rPr lang="bg-BG" sz="3950" dirty="0"/>
+              <a:t>Пример</a:t>
             </a:r>
             <a:r>
               <a:rPr lang="en-US" sz="3950" dirty="0"/>
@@ -36555,12 +36130,16 @@
               </a:buClr>
             </a:pPr>
             <a:r>
+              <a:rPr lang="en-GB" sz="3350" dirty="0"/>
+              <a:t>Чрез</a:t>
+            </a:r>
+            <a:r>
               <a:rPr lang="en-GB" sz="3350" b="1" dirty="0">
                 <a:solidFill>
                   <a:schemeClr val="bg1"/>
                 </a:solidFill>
               </a:rPr>
-              <a:t>Чрез </a:t>
+              <a:t> </a:t>
             </a:r>
             <a:r>
               <a:rPr lang="en-GB" sz="3350" b="1" dirty="0">
@@ -36611,11 +36190,11 @@
               <a:t>Отпечатване на матрица – </a:t>
             </a:r>
             <a:r>
-              <a:rPr lang="en-US" sz="3950" dirty="0" err="1">
+              <a:rPr lang="bg-BG" sz="3950" dirty="0">
                 <a:ea typeface="+mj-lt"/>
                 <a:cs typeface="+mj-lt"/>
               </a:rPr>
-              <a:t>пример</a:t>
+              <a:t>Пример</a:t>
             </a:r>
             <a:r>
               <a:rPr lang="en-US" sz="3950" dirty="0">
@@ -36944,9 +36523,9 @@
                                           </p:stCondLst>
                                         </p:cTn>
                                         <p:tgtEl>
-                                          <p:spTgt spid="3">
+                                          <p:spTgt spid="6">
                                             <p:txEl>
-                                              <p:pRg st="0" end="0"/>
+                                              <p:pRg st="6" end="6"/>
                                             </p:txEl>
                                           </p:spTgt>
                                         </p:tgtEl>
@@ -36961,26 +36540,39 @@
                                   </p:childTnLst>
                                 </p:cTn>
                               </p:par>
-                            </p:childTnLst>
-                          </p:cTn>
-                        </p:par>
-                      </p:childTnLst>
-                    </p:cTn>
-                  </p:par>
-                  <p:par>
-                    <p:cTn id="7" fill="hold">
-                      <p:stCondLst>
-                        <p:cond delay="indefinite"/>
-                      </p:stCondLst>
-                      <p:childTnLst>
-                        <p:par>
-                          <p:cTn id="8" fill="hold">
-                            <p:stCondLst>
-                              <p:cond delay="0"/>
-                            </p:stCondLst>
-                            <p:childTnLst>
                               <p:par>
-                                <p:cTn id="9" presetID="1" presetClass="entr" presetSubtype="0" fill="hold" grpId="0" nodeType="clickEffect">
+                                <p:cTn id="7" presetID="1" presetClass="entr" presetSubtype="0" fill="hold" nodeType="withEffect">
+                                  <p:stCondLst>
+                                    <p:cond delay="0"/>
+                                  </p:stCondLst>
+                                  <p:childTnLst>
+                                    <p:set>
+                                      <p:cBhvr>
+                                        <p:cTn id="8" dur="1" fill="hold">
+                                          <p:stCondLst>
+                                            <p:cond delay="0"/>
+                                          </p:stCondLst>
+                                        </p:cTn>
+                                        <p:tgtEl>
+                                          <p:spTgt spid="6">
+                                            <p:txEl>
+                                              <p:pRg st="7" end="7"/>
+                                            </p:txEl>
+                                          </p:spTgt>
+                                        </p:tgtEl>
+                                        <p:attrNameLst>
+                                          <p:attrName>style.visibility</p:attrName>
+                                        </p:attrNameLst>
+                                      </p:cBhvr>
+                                      <p:to>
+                                        <p:strVal val="visible"/>
+                                      </p:to>
+                                    </p:set>
+                                  </p:childTnLst>
+                                </p:cTn>
+                              </p:par>
+                              <p:par>
+                                <p:cTn id="9" presetID="1" presetClass="entr" presetSubtype="0" fill="hold" nodeType="withEffect">
                                   <p:stCondLst>
                                     <p:cond delay="0"/>
                                   </p:stCondLst>
@@ -36993,7 +36585,42 @@
                                           </p:stCondLst>
                                         </p:cTn>
                                         <p:tgtEl>
-                                          <p:spTgt spid="6"/>
+                                          <p:spTgt spid="6">
+                                            <p:txEl>
+                                              <p:pRg st="8" end="8"/>
+                                            </p:txEl>
+                                          </p:spTgt>
+                                        </p:tgtEl>
+                                        <p:attrNameLst>
+                                          <p:attrName>style.visibility</p:attrName>
+                                        </p:attrNameLst>
+                                      </p:cBhvr>
+                                      <p:to>
+                                        <p:strVal val="visible"/>
+                                      </p:to>
+                                    </p:set>
+                                  </p:childTnLst>
+                                </p:cTn>
+                              </p:par>
+                              <p:par>
+                                <p:cTn id="11" presetID="1" presetClass="entr" presetSubtype="0" fill="hold" nodeType="withEffect">
+                                  <p:stCondLst>
+                                    <p:cond delay="0"/>
+                                  </p:stCondLst>
+                                  <p:childTnLst>
+                                    <p:set>
+                                      <p:cBhvr>
+                                        <p:cTn id="12" dur="1" fill="hold">
+                                          <p:stCondLst>
+                                            <p:cond delay="0"/>
+                                          </p:stCondLst>
+                                        </p:cTn>
+                                        <p:tgtEl>
+                                          <p:spTgt spid="6">
+                                            <p:txEl>
+                                              <p:pRg st="9" end="9"/>
+                                            </p:txEl>
+                                          </p:spTgt>
                                         </p:tgtEl>
                                         <p:attrNameLst>
                                           <p:attrName>style.visibility</p:attrName>
@@ -37033,9 +36660,6 @@
         </p:cTn>
       </p:par>
     </p:tnLst>
-    <p:bldLst>
-      <p:bldP spid="6" grpId="0" animBg="1"/>
-    </p:bldLst>
   </p:timing>
 </p:sld>
 </file>

</xml_diff>